<commit_message>
Redo tests 2 and 3; option for constant properties during calculation
</commit_message>
<xml_diff>
--- a/Tests/Nanothermite/Summary_graphs.pptx
+++ b/Tests/Nanothermite/Summary_graphs.pptx
@@ -4,10 +4,13 @@
   <p:sldMasterIdLst>
     <p:sldMasterId id="2147483648" r:id="rId1"/>
   </p:sldMasterIdLst>
+  <p:notesMasterIdLst>
+    <p:notesMasterId r:id="rId6"/>
+  </p:notesMasterIdLst>
   <p:sldIdLst>
     <p:sldId id="256" r:id="rId2"/>
-    <p:sldId id="257" r:id="rId3"/>
-    <p:sldId id="258" r:id="rId4"/>
+    <p:sldId id="258" r:id="rId3"/>
+    <p:sldId id="257" r:id="rId4"/>
     <p:sldId id="259" r:id="rId5"/>
   </p:sldIdLst>
   <p:sldSz cx="12192000" cy="6858000"/>
@@ -113,6 +116,619 @@
     </p:ext>
   </p:extLst>
 </p:presentation>
+</file>
+
+<file path=ppt/notesMasters/notesMaster1.xml><?xml version="1.0" encoding="utf-8"?>
+<p:notesMaster xmlns:a="http://schemas.openxmlformats.org/drawingml/2006/main" xmlns:r="http://schemas.openxmlformats.org/officeDocument/2006/relationships" xmlns:p="http://schemas.openxmlformats.org/presentationml/2006/main">
+  <p:cSld>
+    <p:bg>
+      <p:bgRef idx="1001">
+        <a:schemeClr val="bg1"/>
+      </p:bgRef>
+    </p:bg>
+    <p:spTree>
+      <p:nvGrpSpPr>
+        <p:cNvPr id="1" name=""/>
+        <p:cNvGrpSpPr/>
+        <p:nvPr/>
+      </p:nvGrpSpPr>
+      <p:grpSpPr>
+        <a:xfrm>
+          <a:off x="0" y="0"/>
+          <a:ext cx="0" cy="0"/>
+          <a:chOff x="0" y="0"/>
+          <a:chExt cx="0" cy="0"/>
+        </a:xfrm>
+      </p:grpSpPr>
+      <p:sp>
+        <p:nvSpPr>
+          <p:cNvPr id="2" name="Header Placeholder 1"/>
+          <p:cNvSpPr>
+            <a:spLocks noGrp="1"/>
+          </p:cNvSpPr>
+          <p:nvPr>
+            <p:ph type="hdr" sz="quarter"/>
+          </p:nvPr>
+        </p:nvSpPr>
+        <p:spPr>
+          <a:xfrm>
+            <a:off x="0" y="0"/>
+            <a:ext cx="2971800" cy="458788"/>
+          </a:xfrm>
+          <a:prstGeom prst="rect">
+            <a:avLst/>
+          </a:prstGeom>
+        </p:spPr>
+        <p:txBody>
+          <a:bodyPr vert="horz" lIns="91440" tIns="45720" rIns="91440" bIns="45720" rtlCol="0"/>
+          <a:lstStyle>
+            <a:lvl1pPr algn="l">
+              <a:defRPr sz="1200"/>
+            </a:lvl1pPr>
+          </a:lstStyle>
+          <a:p>
+            <a:endParaRPr lang="en-CA"/>
+          </a:p>
+        </p:txBody>
+      </p:sp>
+      <p:sp>
+        <p:nvSpPr>
+          <p:cNvPr id="3" name="Date Placeholder 2"/>
+          <p:cNvSpPr>
+            <a:spLocks noGrp="1"/>
+          </p:cNvSpPr>
+          <p:nvPr>
+            <p:ph type="dt" idx="1"/>
+          </p:nvPr>
+        </p:nvSpPr>
+        <p:spPr>
+          <a:xfrm>
+            <a:off x="3884613" y="0"/>
+            <a:ext cx="2971800" cy="458788"/>
+          </a:xfrm>
+          <a:prstGeom prst="rect">
+            <a:avLst/>
+          </a:prstGeom>
+        </p:spPr>
+        <p:txBody>
+          <a:bodyPr vert="horz" lIns="91440" tIns="45720" rIns="91440" bIns="45720" rtlCol="0"/>
+          <a:lstStyle>
+            <a:lvl1pPr algn="r">
+              <a:defRPr sz="1200"/>
+            </a:lvl1pPr>
+          </a:lstStyle>
+          <a:p>
+            <a:fld id="{B019A618-63AB-4F89-8C61-5DE094D48502}" type="datetimeFigureOut">
+              <a:rPr lang="en-CA" smtClean="0"/>
+              <a:t>2019-01-10</a:t>
+            </a:fld>
+            <a:endParaRPr lang="en-CA"/>
+          </a:p>
+        </p:txBody>
+      </p:sp>
+      <p:sp>
+        <p:nvSpPr>
+          <p:cNvPr id="4" name="Slide Image Placeholder 3"/>
+          <p:cNvSpPr>
+            <a:spLocks noGrp="1" noRot="1" noChangeAspect="1"/>
+          </p:cNvSpPr>
+          <p:nvPr>
+            <p:ph type="sldImg" idx="2"/>
+          </p:nvPr>
+        </p:nvSpPr>
+        <p:spPr>
+          <a:xfrm>
+            <a:off x="685800" y="1143000"/>
+            <a:ext cx="5486400" cy="3086100"/>
+          </a:xfrm>
+          <a:prstGeom prst="rect">
+            <a:avLst/>
+          </a:prstGeom>
+          <a:noFill/>
+          <a:ln w="12700">
+            <a:solidFill>
+              <a:prstClr val="black"/>
+            </a:solidFill>
+          </a:ln>
+        </p:spPr>
+        <p:txBody>
+          <a:bodyPr vert="horz" lIns="91440" tIns="45720" rIns="91440" bIns="45720" rtlCol="0" anchor="ctr"/>
+          <a:lstStyle/>
+          <a:p>
+            <a:endParaRPr lang="en-CA"/>
+          </a:p>
+        </p:txBody>
+      </p:sp>
+      <p:sp>
+        <p:nvSpPr>
+          <p:cNvPr id="5" name="Notes Placeholder 4"/>
+          <p:cNvSpPr>
+            <a:spLocks noGrp="1"/>
+          </p:cNvSpPr>
+          <p:nvPr>
+            <p:ph type="body" sz="quarter" idx="3"/>
+          </p:nvPr>
+        </p:nvSpPr>
+        <p:spPr>
+          <a:xfrm>
+            <a:off x="685800" y="4400550"/>
+            <a:ext cx="5486400" cy="3600450"/>
+          </a:xfrm>
+          <a:prstGeom prst="rect">
+            <a:avLst/>
+          </a:prstGeom>
+        </p:spPr>
+        <p:txBody>
+          <a:bodyPr vert="horz" lIns="91440" tIns="45720" rIns="91440" bIns="45720" rtlCol="0"/>
+          <a:lstStyle/>
+          <a:p>
+            <a:pPr lvl="0"/>
+            <a:r>
+              <a:rPr lang="en-US"/>
+              <a:t>Edit Master text styles</a:t>
+            </a:r>
+          </a:p>
+          <a:p>
+            <a:pPr lvl="1"/>
+            <a:r>
+              <a:rPr lang="en-US"/>
+              <a:t>Second level</a:t>
+            </a:r>
+          </a:p>
+          <a:p>
+            <a:pPr lvl="2"/>
+            <a:r>
+              <a:rPr lang="en-US"/>
+              <a:t>Third level</a:t>
+            </a:r>
+          </a:p>
+          <a:p>
+            <a:pPr lvl="3"/>
+            <a:r>
+              <a:rPr lang="en-US"/>
+              <a:t>Fourth level</a:t>
+            </a:r>
+          </a:p>
+          <a:p>
+            <a:pPr lvl="4"/>
+            <a:r>
+              <a:rPr lang="en-US"/>
+              <a:t>Fifth level</a:t>
+            </a:r>
+            <a:endParaRPr lang="en-CA"/>
+          </a:p>
+        </p:txBody>
+      </p:sp>
+      <p:sp>
+        <p:nvSpPr>
+          <p:cNvPr id="6" name="Footer Placeholder 5"/>
+          <p:cNvSpPr>
+            <a:spLocks noGrp="1"/>
+          </p:cNvSpPr>
+          <p:nvPr>
+            <p:ph type="ftr" sz="quarter" idx="4"/>
+          </p:nvPr>
+        </p:nvSpPr>
+        <p:spPr>
+          <a:xfrm>
+            <a:off x="0" y="8685213"/>
+            <a:ext cx="2971800" cy="458787"/>
+          </a:xfrm>
+          <a:prstGeom prst="rect">
+            <a:avLst/>
+          </a:prstGeom>
+        </p:spPr>
+        <p:txBody>
+          <a:bodyPr vert="horz" lIns="91440" tIns="45720" rIns="91440" bIns="45720" rtlCol="0" anchor="b"/>
+          <a:lstStyle>
+            <a:lvl1pPr algn="l">
+              <a:defRPr sz="1200"/>
+            </a:lvl1pPr>
+          </a:lstStyle>
+          <a:p>
+            <a:endParaRPr lang="en-CA"/>
+          </a:p>
+        </p:txBody>
+      </p:sp>
+      <p:sp>
+        <p:nvSpPr>
+          <p:cNvPr id="7" name="Slide Number Placeholder 6"/>
+          <p:cNvSpPr>
+            <a:spLocks noGrp="1"/>
+          </p:cNvSpPr>
+          <p:nvPr>
+            <p:ph type="sldNum" sz="quarter" idx="5"/>
+          </p:nvPr>
+        </p:nvSpPr>
+        <p:spPr>
+          <a:xfrm>
+            <a:off x="3884613" y="8685213"/>
+            <a:ext cx="2971800" cy="458787"/>
+          </a:xfrm>
+          <a:prstGeom prst="rect">
+            <a:avLst/>
+          </a:prstGeom>
+        </p:spPr>
+        <p:txBody>
+          <a:bodyPr vert="horz" lIns="91440" tIns="45720" rIns="91440" bIns="45720" rtlCol="0" anchor="b"/>
+          <a:lstStyle>
+            <a:lvl1pPr algn="r">
+              <a:defRPr sz="1200"/>
+            </a:lvl1pPr>
+          </a:lstStyle>
+          <a:p>
+            <a:fld id="{E1551DFB-0826-40DD-ADF9-7812F4854986}" type="slidenum">
+              <a:rPr lang="en-CA" smtClean="0"/>
+              <a:t>‹#›</a:t>
+            </a:fld>
+            <a:endParaRPr lang="en-CA"/>
+          </a:p>
+        </p:txBody>
+      </p:sp>
+    </p:spTree>
+    <p:extLst>
+      <p:ext uri="{BB962C8B-B14F-4D97-AF65-F5344CB8AC3E}">
+        <p14:creationId xmlns:p14="http://schemas.microsoft.com/office/powerpoint/2010/main" val="1385909920"/>
+      </p:ext>
+    </p:extLst>
+  </p:cSld>
+  <p:clrMap bg1="lt1" tx1="dk1" bg2="lt2" tx2="dk2" accent1="accent1" accent2="accent2" accent3="accent3" accent4="accent4" accent5="accent5" accent6="accent6" hlink="hlink" folHlink="folHlink"/>
+  <p:notesStyle>
+    <a:lvl1pPr marL="0" algn="l" defTabSz="914400" rtl="0" eaLnBrk="1" latinLnBrk="0" hangingPunct="1">
+      <a:defRPr sz="1200" kern="1200">
+        <a:solidFill>
+          <a:schemeClr val="tx1"/>
+        </a:solidFill>
+        <a:latin typeface="+mn-lt"/>
+        <a:ea typeface="+mn-ea"/>
+        <a:cs typeface="+mn-cs"/>
+      </a:defRPr>
+    </a:lvl1pPr>
+    <a:lvl2pPr marL="457200" algn="l" defTabSz="914400" rtl="0" eaLnBrk="1" latinLnBrk="0" hangingPunct="1">
+      <a:defRPr sz="1200" kern="1200">
+        <a:solidFill>
+          <a:schemeClr val="tx1"/>
+        </a:solidFill>
+        <a:latin typeface="+mn-lt"/>
+        <a:ea typeface="+mn-ea"/>
+        <a:cs typeface="+mn-cs"/>
+      </a:defRPr>
+    </a:lvl2pPr>
+    <a:lvl3pPr marL="914400" algn="l" defTabSz="914400" rtl="0" eaLnBrk="1" latinLnBrk="0" hangingPunct="1">
+      <a:defRPr sz="1200" kern="1200">
+        <a:solidFill>
+          <a:schemeClr val="tx1"/>
+        </a:solidFill>
+        <a:latin typeface="+mn-lt"/>
+        <a:ea typeface="+mn-ea"/>
+        <a:cs typeface="+mn-cs"/>
+      </a:defRPr>
+    </a:lvl3pPr>
+    <a:lvl4pPr marL="1371600" algn="l" defTabSz="914400" rtl="0" eaLnBrk="1" latinLnBrk="0" hangingPunct="1">
+      <a:defRPr sz="1200" kern="1200">
+        <a:solidFill>
+          <a:schemeClr val="tx1"/>
+        </a:solidFill>
+        <a:latin typeface="+mn-lt"/>
+        <a:ea typeface="+mn-ea"/>
+        <a:cs typeface="+mn-cs"/>
+      </a:defRPr>
+    </a:lvl4pPr>
+    <a:lvl5pPr marL="1828800" algn="l" defTabSz="914400" rtl="0" eaLnBrk="1" latinLnBrk="0" hangingPunct="1">
+      <a:defRPr sz="1200" kern="1200">
+        <a:solidFill>
+          <a:schemeClr val="tx1"/>
+        </a:solidFill>
+        <a:latin typeface="+mn-lt"/>
+        <a:ea typeface="+mn-ea"/>
+        <a:cs typeface="+mn-cs"/>
+      </a:defRPr>
+    </a:lvl5pPr>
+    <a:lvl6pPr marL="2286000" algn="l" defTabSz="914400" rtl="0" eaLnBrk="1" latinLnBrk="0" hangingPunct="1">
+      <a:defRPr sz="1200" kern="1200">
+        <a:solidFill>
+          <a:schemeClr val="tx1"/>
+        </a:solidFill>
+        <a:latin typeface="+mn-lt"/>
+        <a:ea typeface="+mn-ea"/>
+        <a:cs typeface="+mn-cs"/>
+      </a:defRPr>
+    </a:lvl6pPr>
+    <a:lvl7pPr marL="2743200" algn="l" defTabSz="914400" rtl="0" eaLnBrk="1" latinLnBrk="0" hangingPunct="1">
+      <a:defRPr sz="1200" kern="1200">
+        <a:solidFill>
+          <a:schemeClr val="tx1"/>
+        </a:solidFill>
+        <a:latin typeface="+mn-lt"/>
+        <a:ea typeface="+mn-ea"/>
+        <a:cs typeface="+mn-cs"/>
+      </a:defRPr>
+    </a:lvl7pPr>
+    <a:lvl8pPr marL="3200400" algn="l" defTabSz="914400" rtl="0" eaLnBrk="1" latinLnBrk="0" hangingPunct="1">
+      <a:defRPr sz="1200" kern="1200">
+        <a:solidFill>
+          <a:schemeClr val="tx1"/>
+        </a:solidFill>
+        <a:latin typeface="+mn-lt"/>
+        <a:ea typeface="+mn-ea"/>
+        <a:cs typeface="+mn-cs"/>
+      </a:defRPr>
+    </a:lvl8pPr>
+    <a:lvl9pPr marL="3657600" algn="l" defTabSz="914400" rtl="0" eaLnBrk="1" latinLnBrk="0" hangingPunct="1">
+      <a:defRPr sz="1200" kern="1200">
+        <a:solidFill>
+          <a:schemeClr val="tx1"/>
+        </a:solidFill>
+        <a:latin typeface="+mn-lt"/>
+        <a:ea typeface="+mn-ea"/>
+        <a:cs typeface="+mn-cs"/>
+      </a:defRPr>
+    </a:lvl9pPr>
+  </p:notesStyle>
+</p:notesMaster>
+</file>
+
+<file path=ppt/notesSlides/notesSlide1.xml><?xml version="1.0" encoding="utf-8"?>
+<p:notes xmlns:a="http://schemas.openxmlformats.org/drawingml/2006/main" xmlns:r="http://schemas.openxmlformats.org/officeDocument/2006/relationships" xmlns:p="http://schemas.openxmlformats.org/presentationml/2006/main">
+  <p:cSld>
+    <p:spTree>
+      <p:nvGrpSpPr>
+        <p:cNvPr id="1" name=""/>
+        <p:cNvGrpSpPr/>
+        <p:nvPr/>
+      </p:nvGrpSpPr>
+      <p:grpSpPr>
+        <a:xfrm>
+          <a:off x="0" y="0"/>
+          <a:ext cx="0" cy="0"/>
+          <a:chOff x="0" y="0"/>
+          <a:chExt cx="0" cy="0"/>
+        </a:xfrm>
+      </p:grpSpPr>
+      <p:sp>
+        <p:nvSpPr>
+          <p:cNvPr id="2" name="Slide Image Placeholder 1"/>
+          <p:cNvSpPr>
+            <a:spLocks noGrp="1" noRot="1" noChangeAspect="1"/>
+          </p:cNvSpPr>
+          <p:nvPr>
+            <p:ph type="sldImg"/>
+          </p:nvPr>
+        </p:nvSpPr>
+        <p:spPr/>
+      </p:sp>
+      <p:sp>
+        <p:nvSpPr>
+          <p:cNvPr id="3" name="Notes Placeholder 2"/>
+          <p:cNvSpPr>
+            <a:spLocks noGrp="1"/>
+          </p:cNvSpPr>
+          <p:nvPr>
+            <p:ph type="body" idx="1"/>
+          </p:nvPr>
+        </p:nvSpPr>
+        <p:spPr/>
+        <p:txBody>
+          <a:bodyPr/>
+          <a:lstStyle/>
+          <a:p>
+            <a:r>
+              <a:rPr lang="en-CA" dirty="0" err="1"/>
+              <a:t>Ea</a:t>
+            </a:r>
+            <a:endParaRPr lang="en-CA" dirty="0"/>
+          </a:p>
+        </p:txBody>
+      </p:sp>
+      <p:sp>
+        <p:nvSpPr>
+          <p:cNvPr id="4" name="Slide Number Placeholder 3"/>
+          <p:cNvSpPr>
+            <a:spLocks noGrp="1"/>
+          </p:cNvSpPr>
+          <p:nvPr>
+            <p:ph type="sldNum" sz="quarter" idx="10"/>
+          </p:nvPr>
+        </p:nvSpPr>
+        <p:spPr/>
+        <p:txBody>
+          <a:bodyPr/>
+          <a:lstStyle/>
+          <a:p>
+            <a:fld id="{E1551DFB-0826-40DD-ADF9-7812F4854986}" type="slidenum">
+              <a:rPr lang="en-CA" smtClean="0"/>
+              <a:t>2</a:t>
+            </a:fld>
+            <a:endParaRPr lang="en-CA"/>
+          </a:p>
+        </p:txBody>
+      </p:sp>
+    </p:spTree>
+    <p:extLst>
+      <p:ext uri="{BB962C8B-B14F-4D97-AF65-F5344CB8AC3E}">
+        <p14:creationId xmlns:p14="http://schemas.microsoft.com/office/powerpoint/2010/main" val="1998775865"/>
+      </p:ext>
+    </p:extLst>
+  </p:cSld>
+  <p:clrMapOvr>
+    <a:masterClrMapping/>
+  </p:clrMapOvr>
+</p:notes>
+</file>
+
+<file path=ppt/notesSlides/notesSlide2.xml><?xml version="1.0" encoding="utf-8"?>
+<p:notes xmlns:a="http://schemas.openxmlformats.org/drawingml/2006/main" xmlns:r="http://schemas.openxmlformats.org/officeDocument/2006/relationships" xmlns:p="http://schemas.openxmlformats.org/presentationml/2006/main">
+  <p:cSld>
+    <p:spTree>
+      <p:nvGrpSpPr>
+        <p:cNvPr id="1" name=""/>
+        <p:cNvGrpSpPr/>
+        <p:nvPr/>
+      </p:nvGrpSpPr>
+      <p:grpSpPr>
+        <a:xfrm>
+          <a:off x="0" y="0"/>
+          <a:ext cx="0" cy="0"/>
+          <a:chOff x="0" y="0"/>
+          <a:chExt cx="0" cy="0"/>
+        </a:xfrm>
+      </p:grpSpPr>
+      <p:sp>
+        <p:nvSpPr>
+          <p:cNvPr id="2" name="Slide Image Placeholder 1"/>
+          <p:cNvSpPr>
+            <a:spLocks noGrp="1" noRot="1" noChangeAspect="1"/>
+          </p:cNvSpPr>
+          <p:nvPr>
+            <p:ph type="sldImg"/>
+          </p:nvPr>
+        </p:nvSpPr>
+        <p:spPr/>
+      </p:sp>
+      <p:sp>
+        <p:nvSpPr>
+          <p:cNvPr id="3" name="Notes Placeholder 2"/>
+          <p:cNvSpPr>
+            <a:spLocks noGrp="1"/>
+          </p:cNvSpPr>
+          <p:nvPr>
+            <p:ph type="body" idx="1"/>
+          </p:nvPr>
+        </p:nvSpPr>
+        <p:spPr/>
+        <p:txBody>
+          <a:bodyPr/>
+          <a:lstStyle/>
+          <a:p>
+            <a:r>
+              <a:rPr lang="en-CA" dirty="0" err="1"/>
+              <a:t>dH</a:t>
+            </a:r>
+            <a:endParaRPr lang="en-CA" dirty="0"/>
+          </a:p>
+        </p:txBody>
+      </p:sp>
+      <p:sp>
+        <p:nvSpPr>
+          <p:cNvPr id="4" name="Slide Number Placeholder 3"/>
+          <p:cNvSpPr>
+            <a:spLocks noGrp="1"/>
+          </p:cNvSpPr>
+          <p:nvPr>
+            <p:ph type="sldNum" sz="quarter" idx="10"/>
+          </p:nvPr>
+        </p:nvSpPr>
+        <p:spPr/>
+        <p:txBody>
+          <a:bodyPr/>
+          <a:lstStyle/>
+          <a:p>
+            <a:fld id="{E1551DFB-0826-40DD-ADF9-7812F4854986}" type="slidenum">
+              <a:rPr lang="en-CA" smtClean="0"/>
+              <a:t>3</a:t>
+            </a:fld>
+            <a:endParaRPr lang="en-CA"/>
+          </a:p>
+        </p:txBody>
+      </p:sp>
+    </p:spTree>
+    <p:extLst>
+      <p:ext uri="{BB962C8B-B14F-4D97-AF65-F5344CB8AC3E}">
+        <p14:creationId xmlns:p14="http://schemas.microsoft.com/office/powerpoint/2010/main" val="3366434941"/>
+      </p:ext>
+    </p:extLst>
+  </p:cSld>
+  <p:clrMapOvr>
+    <a:masterClrMapping/>
+  </p:clrMapOvr>
+</p:notes>
+</file>
+
+<file path=ppt/notesSlides/notesSlide3.xml><?xml version="1.0" encoding="utf-8"?>
+<p:notes xmlns:a="http://schemas.openxmlformats.org/drawingml/2006/main" xmlns:r="http://schemas.openxmlformats.org/officeDocument/2006/relationships" xmlns:p="http://schemas.openxmlformats.org/presentationml/2006/main">
+  <p:cSld>
+    <p:spTree>
+      <p:nvGrpSpPr>
+        <p:cNvPr id="1" name=""/>
+        <p:cNvGrpSpPr/>
+        <p:nvPr/>
+      </p:nvGrpSpPr>
+      <p:grpSpPr>
+        <a:xfrm>
+          <a:off x="0" y="0"/>
+          <a:ext cx="0" cy="0"/>
+          <a:chOff x="0" y="0"/>
+          <a:chExt cx="0" cy="0"/>
+        </a:xfrm>
+      </p:grpSpPr>
+      <p:sp>
+        <p:nvSpPr>
+          <p:cNvPr id="2" name="Slide Image Placeholder 1"/>
+          <p:cNvSpPr>
+            <a:spLocks noGrp="1" noRot="1" noChangeAspect="1"/>
+          </p:cNvSpPr>
+          <p:nvPr>
+            <p:ph type="sldImg"/>
+          </p:nvPr>
+        </p:nvSpPr>
+        <p:spPr/>
+      </p:sp>
+      <p:sp>
+        <p:nvSpPr>
+          <p:cNvPr id="3" name="Notes Placeholder 2"/>
+          <p:cNvSpPr>
+            <a:spLocks noGrp="1"/>
+          </p:cNvSpPr>
+          <p:nvPr>
+            <p:ph type="body" idx="1"/>
+          </p:nvPr>
+        </p:nvSpPr>
+        <p:spPr/>
+        <p:txBody>
+          <a:bodyPr/>
+          <a:lstStyle/>
+          <a:p>
+            <a:r>
+              <a:rPr lang="en-CA" dirty="0"/>
+              <a:t>A0</a:t>
+            </a:r>
+          </a:p>
+        </p:txBody>
+      </p:sp>
+      <p:sp>
+        <p:nvSpPr>
+          <p:cNvPr id="4" name="Slide Number Placeholder 3"/>
+          <p:cNvSpPr>
+            <a:spLocks noGrp="1"/>
+          </p:cNvSpPr>
+          <p:nvPr>
+            <p:ph type="sldNum" sz="quarter" idx="10"/>
+          </p:nvPr>
+        </p:nvSpPr>
+        <p:spPr/>
+        <p:txBody>
+          <a:bodyPr/>
+          <a:lstStyle/>
+          <a:p>
+            <a:fld id="{E1551DFB-0826-40DD-ADF9-7812F4854986}" type="slidenum">
+              <a:rPr lang="en-CA" smtClean="0"/>
+              <a:t>4</a:t>
+            </a:fld>
+            <a:endParaRPr lang="en-CA"/>
+          </a:p>
+        </p:txBody>
+      </p:sp>
+    </p:spTree>
+    <p:extLst>
+      <p:ext uri="{BB962C8B-B14F-4D97-AF65-F5344CB8AC3E}">
+        <p14:creationId xmlns:p14="http://schemas.microsoft.com/office/powerpoint/2010/main" val="160168198"/>
+      </p:ext>
+    </p:extLst>
+  </p:cSld>
+  <p:clrMapOvr>
+    <a:masterClrMapping/>
+  </p:clrMapOvr>
+</p:notes>
 </file>
 
 <file path=ppt/slideLayouts/slideLayout1.xml><?xml version="1.0" encoding="utf-8"?>
@@ -3368,26 +3984,29 @@
         </p:nvSpPr>
         <p:spPr>
           <a:xfrm>
-            <a:off x="1524000" y="1132114"/>
-            <a:ext cx="4572000" cy="4125686"/>
+            <a:off x="1524000" y="1132113"/>
+            <a:ext cx="4572000" cy="1654629"/>
           </a:xfrm>
         </p:spPr>
         <p:txBody>
           <a:bodyPr/>
           <a:lstStyle/>
           <a:p>
+            <a:pPr algn="l"/>
             <a:r>
               <a:rPr lang="en-CA" dirty="0"/>
               <a:t>rho=6000</a:t>
             </a:r>
           </a:p>
           <a:p>
+            <a:pPr algn="l"/>
             <a:r>
               <a:rPr lang="en-CA" dirty="0"/>
               <a:t>k=70</a:t>
             </a:r>
           </a:p>
           <a:p>
+            <a:pPr algn="l"/>
             <a:r>
               <a:rPr lang="en-CA" dirty="0" err="1"/>
               <a:t>Cp</a:t>
@@ -3416,7 +4035,7 @@
         <p:spPr>
           <a:xfrm>
             <a:off x="6096000" y="1132114"/>
-            <a:ext cx="4572000" cy="4125686"/>
+            <a:ext cx="4572000" cy="1654629"/>
           </a:xfrm>
           <a:prstGeom prst="rect">
             <a:avLst/>
@@ -3591,6 +4210,7 @@
             </a:lvl9pPr>
           </a:lstStyle>
           <a:p>
+            <a:pPr algn="l"/>
             <a:r>
               <a:rPr lang="en-CA" dirty="0" err="1"/>
               <a:t>Fo</a:t>
@@ -3601,15 +4221,131 @@
             </a:r>
           </a:p>
           <a:p>
+            <a:pPr algn="l"/>
             <a:r>
               <a:rPr lang="en-CA" dirty="0"/>
               <a:t>6000 time steps</a:t>
             </a:r>
           </a:p>
           <a:p>
+            <a:pPr algn="l"/>
             <a:r>
               <a:rPr lang="en-CA" dirty="0"/>
               <a:t>6 data files</a:t>
+            </a:r>
+          </a:p>
+        </p:txBody>
+      </p:sp>
+      <p:sp>
+        <p:nvSpPr>
+          <p:cNvPr id="2" name="TextBox 1">
+            <a:extLst>
+              <a:ext uri="{FF2B5EF4-FFF2-40B4-BE49-F238E27FC236}">
+                <a16:creationId xmlns:a16="http://schemas.microsoft.com/office/drawing/2014/main" id="{DA4E6C74-1D3B-40B0-9D38-4486ACFDDA5E}"/>
+              </a:ext>
+            </a:extLst>
+          </p:cNvPr>
+          <p:cNvSpPr txBox="1"/>
+          <p:nvPr/>
+        </p:nvSpPr>
+        <p:spPr>
+          <a:xfrm>
+            <a:off x="2119086" y="4267200"/>
+            <a:ext cx="2612571" cy="369332"/>
+          </a:xfrm>
+          <a:prstGeom prst="rect">
+            <a:avLst/>
+          </a:prstGeom>
+          <a:noFill/>
+        </p:spPr>
+        <p:txBody>
+          <a:bodyPr wrap="square" rtlCol="0">
+            <a:spAutoFit/>
+          </a:bodyPr>
+          <a:lstStyle/>
+          <a:p>
+            <a:r>
+              <a:rPr lang="en-CA" dirty="0"/>
+              <a:t>Tests can overwrite: 4,5</a:t>
+            </a:r>
+          </a:p>
+        </p:txBody>
+      </p:sp>
+      <p:sp>
+        <p:nvSpPr>
+          <p:cNvPr id="5" name="TextBox 4">
+            <a:extLst>
+              <a:ext uri="{FF2B5EF4-FFF2-40B4-BE49-F238E27FC236}">
+                <a16:creationId xmlns:a16="http://schemas.microsoft.com/office/drawing/2014/main" id="{898150A5-E4D4-4673-8CF4-C78D89C085C1}"/>
+              </a:ext>
+            </a:extLst>
+          </p:cNvPr>
+          <p:cNvSpPr txBox="1"/>
+          <p:nvPr/>
+        </p:nvSpPr>
+        <p:spPr>
+          <a:xfrm>
+            <a:off x="2119085" y="4801773"/>
+            <a:ext cx="3265715" cy="923330"/>
+          </a:xfrm>
+          <a:prstGeom prst="rect">
+            <a:avLst/>
+          </a:prstGeom>
+          <a:noFill/>
+        </p:spPr>
+        <p:txBody>
+          <a:bodyPr wrap="square" rtlCol="0">
+            <a:spAutoFit/>
+          </a:bodyPr>
+          <a:lstStyle/>
+          <a:p>
+            <a:r>
+              <a:rPr lang="en-CA" dirty="0"/>
+              <a:t>Diverging parameters:</a:t>
+            </a:r>
+          </a:p>
+          <a:p>
+            <a:r>
+              <a:rPr lang="en-CA" dirty="0"/>
+              <a:t>-</a:t>
+            </a:r>
+            <a:r>
+              <a:rPr lang="en-CA" dirty="0" err="1"/>
+              <a:t>Ea</a:t>
+            </a:r>
+            <a:r>
+              <a:rPr lang="en-CA" dirty="0"/>
+              <a:t>=4000, A0=1e6, </a:t>
+            </a:r>
+            <a:r>
+              <a:rPr lang="en-CA" dirty="0" err="1"/>
+              <a:t>dH</a:t>
+            </a:r>
+            <a:r>
+              <a:rPr lang="en-CA" dirty="0"/>
+              <a:t>=300000</a:t>
+            </a:r>
+          </a:p>
+          <a:p>
+            <a:r>
+              <a:rPr lang="en-CA" dirty="0"/>
+              <a:t>-</a:t>
+            </a:r>
+            <a:r>
+              <a:rPr lang="en-CA" dirty="0" err="1"/>
+              <a:t>Ea</a:t>
+            </a:r>
+            <a:r>
+              <a:rPr lang="en-CA" dirty="0"/>
+              <a:t>=4000, A0=1e8, </a:t>
+            </a:r>
+            <a:r>
+              <a:rPr lang="en-CA" dirty="0" err="1"/>
+              <a:t>dH</a:t>
+            </a:r>
+            <a:r>
+              <a:rPr lang="en-CA" dirty="0"/>
+              <a:t>=300000</a:t>
             </a:r>
           </a:p>
         </p:txBody>
@@ -3644,48 +4380,141 @@
           <a:chExt cx="0" cy="0"/>
         </a:xfrm>
       </p:grpSpPr>
-      <p:pic>
-        <p:nvPicPr>
-          <p:cNvPr id="5" name="Picture 4">
-            <a:extLst>
-              <a:ext uri="{FF2B5EF4-FFF2-40B4-BE49-F238E27FC236}">
-                <a16:creationId xmlns:a16="http://schemas.microsoft.com/office/drawing/2014/main" id="{58C1088F-CDCD-4131-9412-5EFA1DC258E6}"/>
-              </a:ext>
-            </a:extLst>
-          </p:cNvPr>
-          <p:cNvPicPr>
-            <a:picLocks noChangeAspect="1"/>
-          </p:cNvPicPr>
+      <p:sp>
+        <p:nvSpPr>
+          <p:cNvPr id="13" name="TextBox 12">
+            <a:extLst>
+              <a:ext uri="{FF2B5EF4-FFF2-40B4-BE49-F238E27FC236}">
+                <a16:creationId xmlns:a16="http://schemas.microsoft.com/office/drawing/2014/main" id="{45781C38-3052-46B3-BC71-40631ECA081B}"/>
+              </a:ext>
+            </a:extLst>
+          </p:cNvPr>
+          <p:cNvSpPr txBox="1"/>
           <p:nvPr/>
-        </p:nvPicPr>
-        <p:blipFill>
-          <a:blip r:embed="rId2">
-            <a:extLst>
-              <a:ext uri="{28A0092B-C50C-407E-A947-70E740481C1C}">
-                <a14:useLocalDpi xmlns:a14="http://schemas.microsoft.com/office/drawing/2010/main" val="0"/>
-              </a:ext>
-            </a:extLst>
-          </a:blip>
-          <a:stretch>
-            <a:fillRect/>
-          </a:stretch>
-        </p:blipFill>
-        <p:spPr>
-          <a:xfrm>
-            <a:off x="477793" y="1931024"/>
-            <a:ext cx="2405016" cy="2405016"/>
+        </p:nvSpPr>
+        <p:spPr>
+          <a:xfrm>
+            <a:off x="2900041" y="1221871"/>
+            <a:ext cx="1543746" cy="646331"/>
           </a:xfrm>
           <a:prstGeom prst="rect">
             <a:avLst/>
           </a:prstGeom>
-        </p:spPr>
-      </p:pic>
+          <a:noFill/>
+        </p:spPr>
+        <p:txBody>
+          <a:bodyPr wrap="square" rtlCol="0">
+            <a:spAutoFit/>
+          </a:bodyPr>
+          <a:lstStyle/>
+          <a:p>
+            <a:r>
+              <a:rPr lang="en-CA" dirty="0"/>
+              <a:t>(8)</a:t>
+            </a:r>
+          </a:p>
+          <a:p>
+            <a:r>
+              <a:rPr lang="en-CA" dirty="0" err="1"/>
+              <a:t>Ea</a:t>
+            </a:r>
+            <a:r>
+              <a:rPr lang="en-CA" dirty="0"/>
+              <a:t>=70000</a:t>
+            </a:r>
+          </a:p>
+        </p:txBody>
+      </p:sp>
+      <p:sp>
+        <p:nvSpPr>
+          <p:cNvPr id="18" name="TextBox 17">
+            <a:extLst>
+              <a:ext uri="{FF2B5EF4-FFF2-40B4-BE49-F238E27FC236}">
+                <a16:creationId xmlns:a16="http://schemas.microsoft.com/office/drawing/2014/main" id="{41A60E4F-9403-4F24-9ACF-6D8AD40FFCC0}"/>
+              </a:ext>
+            </a:extLst>
+          </p:cNvPr>
+          <p:cNvSpPr txBox="1"/>
+          <p:nvPr/>
+        </p:nvSpPr>
+        <p:spPr>
+          <a:xfrm>
+            <a:off x="5099083" y="1221871"/>
+            <a:ext cx="1543747" cy="646331"/>
+          </a:xfrm>
+          <a:prstGeom prst="rect">
+            <a:avLst/>
+          </a:prstGeom>
+          <a:noFill/>
+        </p:spPr>
+        <p:txBody>
+          <a:bodyPr wrap="square" rtlCol="0">
+            <a:spAutoFit/>
+          </a:bodyPr>
+          <a:lstStyle/>
+          <a:p>
+            <a:r>
+              <a:rPr lang="en-CA" dirty="0"/>
+              <a:t>(9)</a:t>
+            </a:r>
+          </a:p>
+          <a:p>
+            <a:r>
+              <a:rPr lang="en-CA" dirty="0" err="1"/>
+              <a:t>Ea</a:t>
+            </a:r>
+            <a:r>
+              <a:rPr lang="en-CA" dirty="0"/>
+              <a:t>=170000</a:t>
+            </a:r>
+          </a:p>
+        </p:txBody>
+      </p:sp>
+      <p:sp>
+        <p:nvSpPr>
+          <p:cNvPr id="9" name="TextBox 8">
+            <a:extLst>
+              <a:ext uri="{FF2B5EF4-FFF2-40B4-BE49-F238E27FC236}">
+                <a16:creationId xmlns:a16="http://schemas.microsoft.com/office/drawing/2014/main" id="{41A3C277-5DAA-4D2F-A5CA-FC7C758FC832}"/>
+              </a:ext>
+            </a:extLst>
+          </p:cNvPr>
+          <p:cNvSpPr txBox="1"/>
+          <p:nvPr/>
+        </p:nvSpPr>
+        <p:spPr>
+          <a:xfrm>
+            <a:off x="377505" y="233318"/>
+            <a:ext cx="2176448" cy="369332"/>
+          </a:xfrm>
+          <a:prstGeom prst="rect">
+            <a:avLst/>
+          </a:prstGeom>
+          <a:noFill/>
+        </p:spPr>
+        <p:txBody>
+          <a:bodyPr wrap="square" rtlCol="0">
+            <a:spAutoFit/>
+          </a:bodyPr>
+          <a:lstStyle/>
+          <a:p>
+            <a:r>
+              <a:rPr lang="en-CA" b="1" dirty="0" err="1"/>
+              <a:t>Ea</a:t>
+            </a:r>
+            <a:r>
+              <a:rPr lang="en-CA" b="1" dirty="0"/>
+              <a:t> investigations</a:t>
+            </a:r>
+          </a:p>
+        </p:txBody>
+      </p:sp>
       <p:pic>
         <p:nvPicPr>
-          <p:cNvPr id="7" name="Picture 6">
-            <a:extLst>
-              <a:ext uri="{FF2B5EF4-FFF2-40B4-BE49-F238E27FC236}">
-                <a16:creationId xmlns:a16="http://schemas.microsoft.com/office/drawing/2014/main" id="{F9AB593A-E224-4906-AF5E-BB09FD2B25A2}"/>
+          <p:cNvPr id="10" name="Picture 9">
+            <a:extLst>
+              <a:ext uri="{FF2B5EF4-FFF2-40B4-BE49-F238E27FC236}">
+                <a16:creationId xmlns:a16="http://schemas.microsoft.com/office/drawing/2014/main" id="{0B374624-C865-432F-A233-E1C6F2F92B5C}"/>
               </a:ext>
             </a:extLst>
           </p:cNvPr>
@@ -3708,7 +4537,7 @@
         </p:blipFill>
         <p:spPr>
           <a:xfrm>
-            <a:off x="477794" y="4218441"/>
+            <a:off x="302815" y="1974853"/>
             <a:ext cx="2405016" cy="2405016"/>
           </a:xfrm>
           <a:prstGeom prst="rect">
@@ -3716,67 +4545,12 @@
           </a:prstGeom>
         </p:spPr>
       </p:pic>
-      <p:sp>
-        <p:nvSpPr>
-          <p:cNvPr id="8" name="TextBox 7">
-            <a:extLst>
-              <a:ext uri="{FF2B5EF4-FFF2-40B4-BE49-F238E27FC236}">
-                <a16:creationId xmlns:a16="http://schemas.microsoft.com/office/drawing/2014/main" id="{FD148865-3CB4-4023-9A0C-5737DE4686A6}"/>
-              </a:ext>
-            </a:extLst>
-          </p:cNvPr>
-          <p:cNvSpPr txBox="1"/>
-          <p:nvPr/>
-        </p:nvSpPr>
-        <p:spPr>
-          <a:xfrm>
-            <a:off x="763227" y="928695"/>
-            <a:ext cx="1543745" cy="923330"/>
-          </a:xfrm>
-          <a:prstGeom prst="rect">
-            <a:avLst/>
-          </a:prstGeom>
-          <a:noFill/>
-        </p:spPr>
-        <p:txBody>
-          <a:bodyPr wrap="square" rtlCol="0">
-            <a:spAutoFit/>
-          </a:bodyPr>
-          <a:lstStyle/>
-          <a:p>
-            <a:r>
-              <a:rPr lang="en-CA" dirty="0" err="1"/>
-              <a:t>Ea</a:t>
-            </a:r>
-            <a:r>
-              <a:rPr lang="en-CA" dirty="0"/>
-              <a:t>=40000</a:t>
-            </a:r>
-          </a:p>
-          <a:p>
-            <a:r>
-              <a:rPr lang="en-CA" dirty="0"/>
-              <a:t>A0=1e8</a:t>
-            </a:r>
-          </a:p>
-          <a:p>
-            <a:r>
-              <a:rPr lang="en-CA" dirty="0" err="1"/>
-              <a:t>dH</a:t>
-            </a:r>
-            <a:r>
-              <a:rPr lang="en-CA" dirty="0"/>
-              <a:t>=300000</a:t>
-            </a:r>
-          </a:p>
-        </p:txBody>
-      </p:sp>
       <p:pic>
         <p:nvPicPr>
-          <p:cNvPr id="10" name="Picture 9">
-            <a:extLst>
-              <a:ext uri="{FF2B5EF4-FFF2-40B4-BE49-F238E27FC236}">
-                <a16:creationId xmlns:a16="http://schemas.microsoft.com/office/drawing/2014/main" id="{2EB08A70-F083-45EB-9DAD-06163368EC8B}"/>
+          <p:cNvPr id="11" name="Picture 10">
+            <a:extLst>
+              <a:ext uri="{FF2B5EF4-FFF2-40B4-BE49-F238E27FC236}">
+                <a16:creationId xmlns:a16="http://schemas.microsoft.com/office/drawing/2014/main" id="{10F1550C-BE22-42C8-86D1-F0D65ED64CD6}"/>
               </a:ext>
             </a:extLst>
           </p:cNvPr>
@@ -3799,7 +4573,7 @@
         </p:blipFill>
         <p:spPr>
           <a:xfrm>
-            <a:off x="2636054" y="1931024"/>
+            <a:off x="302816" y="4262270"/>
             <a:ext cx="2405016" cy="2405016"/>
           </a:xfrm>
           <a:prstGeom prst="rect">
@@ -3807,12 +4581,73 @@
           </a:prstGeom>
         </p:spPr>
       </p:pic>
+      <p:sp>
+        <p:nvSpPr>
+          <p:cNvPr id="12" name="TextBox 11">
+            <a:extLst>
+              <a:ext uri="{FF2B5EF4-FFF2-40B4-BE49-F238E27FC236}">
+                <a16:creationId xmlns:a16="http://schemas.microsoft.com/office/drawing/2014/main" id="{75BBE68D-2B18-46BE-84DC-A595594986A5}"/>
+              </a:ext>
+            </a:extLst>
+          </p:cNvPr>
+          <p:cNvSpPr txBox="1"/>
+          <p:nvPr/>
+        </p:nvSpPr>
+        <p:spPr>
+          <a:xfrm>
+            <a:off x="588250" y="806372"/>
+            <a:ext cx="1543745" cy="1200329"/>
+          </a:xfrm>
+          <a:prstGeom prst="rect">
+            <a:avLst/>
+          </a:prstGeom>
+          <a:noFill/>
+        </p:spPr>
+        <p:txBody>
+          <a:bodyPr wrap="square" rtlCol="0">
+            <a:spAutoFit/>
+          </a:bodyPr>
+          <a:lstStyle/>
+          <a:p>
+            <a:r>
+              <a:rPr lang="en-CA" dirty="0"/>
+              <a:t>(1)</a:t>
+            </a:r>
+          </a:p>
+          <a:p>
+            <a:r>
+              <a:rPr lang="en-CA" dirty="0" err="1"/>
+              <a:t>Ea</a:t>
+            </a:r>
+            <a:r>
+              <a:rPr lang="en-CA" dirty="0"/>
+              <a:t>=40000</a:t>
+            </a:r>
+          </a:p>
+          <a:p>
+            <a:r>
+              <a:rPr lang="en-CA" dirty="0"/>
+              <a:t>A0=1e8</a:t>
+            </a:r>
+          </a:p>
+          <a:p>
+            <a:r>
+              <a:rPr lang="en-CA" dirty="0" err="1"/>
+              <a:t>dH</a:t>
+            </a:r>
+            <a:r>
+              <a:rPr lang="en-CA" dirty="0"/>
+              <a:t>=300000</a:t>
+            </a:r>
+          </a:p>
+        </p:txBody>
+      </p:sp>
       <p:pic>
         <p:nvPicPr>
-          <p:cNvPr id="12" name="Picture 11">
-            <a:extLst>
-              <a:ext uri="{FF2B5EF4-FFF2-40B4-BE49-F238E27FC236}">
-                <a16:creationId xmlns:a16="http://schemas.microsoft.com/office/drawing/2014/main" id="{18F1FFC1-5F69-4A74-9B00-1662AA86DA3A}"/>
+          <p:cNvPr id="3" name="Picture 2">
+            <a:extLst>
+              <a:ext uri="{FF2B5EF4-FFF2-40B4-BE49-F238E27FC236}">
+                <a16:creationId xmlns:a16="http://schemas.microsoft.com/office/drawing/2014/main" id="{FCED7603-6716-4631-AE4F-60D7497FF17C}"/>
               </a:ext>
             </a:extLst>
           </p:cNvPr>
@@ -3835,7 +4670,7 @@
         </p:blipFill>
         <p:spPr>
           <a:xfrm>
-            <a:off x="2636054" y="4218440"/>
+            <a:off x="2496356" y="1984199"/>
             <a:ext cx="2405016" cy="2405016"/>
           </a:xfrm>
           <a:prstGeom prst="rect">
@@ -3843,102 +4678,12 @@
           </a:prstGeom>
         </p:spPr>
       </p:pic>
-      <p:sp>
-        <p:nvSpPr>
-          <p:cNvPr id="13" name="TextBox 12">
-            <a:extLst>
-              <a:ext uri="{FF2B5EF4-FFF2-40B4-BE49-F238E27FC236}">
-                <a16:creationId xmlns:a16="http://schemas.microsoft.com/office/drawing/2014/main" id="{45781C38-3052-46B3-BC71-40631ECA081B}"/>
-              </a:ext>
-            </a:extLst>
-          </p:cNvPr>
-          <p:cNvSpPr txBox="1"/>
-          <p:nvPr/>
-        </p:nvSpPr>
-        <p:spPr>
-          <a:xfrm>
-            <a:off x="3066689" y="928695"/>
-            <a:ext cx="1543746" cy="646331"/>
-          </a:xfrm>
-          <a:prstGeom prst="rect">
-            <a:avLst/>
-          </a:prstGeom>
-          <a:noFill/>
-        </p:spPr>
-        <p:txBody>
-          <a:bodyPr wrap="square" rtlCol="0">
-            <a:spAutoFit/>
-          </a:bodyPr>
-          <a:lstStyle/>
-          <a:p>
-            <a:r>
-              <a:rPr lang="en-CA" dirty="0"/>
-              <a:t>A0=1e6</a:t>
-            </a:r>
-          </a:p>
-          <a:p>
-            <a:r>
-              <a:rPr lang="en-CA" dirty="0" err="1"/>
-              <a:t>dH</a:t>
-            </a:r>
-            <a:r>
-              <a:rPr lang="en-CA" dirty="0"/>
-              <a:t>=300000</a:t>
-            </a:r>
-          </a:p>
-        </p:txBody>
-      </p:sp>
-      <p:sp>
-        <p:nvSpPr>
-          <p:cNvPr id="18" name="TextBox 17">
-            <a:extLst>
-              <a:ext uri="{FF2B5EF4-FFF2-40B4-BE49-F238E27FC236}">
-                <a16:creationId xmlns:a16="http://schemas.microsoft.com/office/drawing/2014/main" id="{41A60E4F-9403-4F24-9ACF-6D8AD40FFCC0}"/>
-              </a:ext>
-            </a:extLst>
-          </p:cNvPr>
-          <p:cNvSpPr txBox="1"/>
-          <p:nvPr/>
-        </p:nvSpPr>
-        <p:spPr>
-          <a:xfrm>
-            <a:off x="5251365" y="947356"/>
-            <a:ext cx="1543747" cy="646331"/>
-          </a:xfrm>
-          <a:prstGeom prst="rect">
-            <a:avLst/>
-          </a:prstGeom>
-          <a:noFill/>
-        </p:spPr>
-        <p:txBody>
-          <a:bodyPr wrap="square" rtlCol="0">
-            <a:spAutoFit/>
-          </a:bodyPr>
-          <a:lstStyle/>
-          <a:p>
-            <a:r>
-              <a:rPr lang="en-CA" dirty="0"/>
-              <a:t>A0=1e6</a:t>
-            </a:r>
-          </a:p>
-          <a:p>
-            <a:r>
-              <a:rPr lang="en-CA" dirty="0" err="1"/>
-              <a:t>dH</a:t>
-            </a:r>
-            <a:r>
-              <a:rPr lang="en-CA" dirty="0"/>
-              <a:t>=30000</a:t>
-            </a:r>
-          </a:p>
-        </p:txBody>
-      </p:sp>
       <p:pic>
         <p:nvPicPr>
-          <p:cNvPr id="22" name="Picture 21">
-            <a:extLst>
-              <a:ext uri="{FF2B5EF4-FFF2-40B4-BE49-F238E27FC236}">
-                <a16:creationId xmlns:a16="http://schemas.microsoft.com/office/drawing/2014/main" id="{24F20116-0F76-4358-A843-3ECE6028134F}"/>
+          <p:cNvPr id="5" name="Picture 4">
+            <a:extLst>
+              <a:ext uri="{FF2B5EF4-FFF2-40B4-BE49-F238E27FC236}">
+                <a16:creationId xmlns:a16="http://schemas.microsoft.com/office/drawing/2014/main" id="{BE880514-5BD0-48F0-BF90-A31CA760DA37}"/>
               </a:ext>
             </a:extLst>
           </p:cNvPr>
@@ -3961,8 +4706,8 @@
         </p:blipFill>
         <p:spPr>
           <a:xfrm>
-            <a:off x="6966810" y="1941764"/>
-            <a:ext cx="2405017" cy="2405017"/>
+            <a:off x="2469406" y="4262270"/>
+            <a:ext cx="2405016" cy="2405016"/>
           </a:xfrm>
           <a:prstGeom prst="rect">
             <a:avLst/>
@@ -3971,10 +4716,10 @@
       </p:pic>
       <p:pic>
         <p:nvPicPr>
-          <p:cNvPr id="24" name="Picture 23">
-            <a:extLst>
-              <a:ext uri="{FF2B5EF4-FFF2-40B4-BE49-F238E27FC236}">
-                <a16:creationId xmlns:a16="http://schemas.microsoft.com/office/drawing/2014/main" id="{ED04408A-BE1A-4885-955F-4357E68546AA}"/>
+          <p:cNvPr id="7" name="Picture 6">
+            <a:extLst>
+              <a:ext uri="{FF2B5EF4-FFF2-40B4-BE49-F238E27FC236}">
+                <a16:creationId xmlns:a16="http://schemas.microsoft.com/office/drawing/2014/main" id="{6F2CA1AD-5FFA-444B-9ACF-D82D6ABACAE5}"/>
               </a:ext>
             </a:extLst>
           </p:cNvPr>
@@ -3997,157 +4742,54 @@
         </p:blipFill>
         <p:spPr>
           <a:xfrm>
-            <a:off x="6966809" y="4207696"/>
-            <a:ext cx="2405017" cy="2405017"/>
+            <a:off x="4724421" y="1984199"/>
+            <a:ext cx="2405016" cy="2405016"/>
           </a:xfrm>
           <a:prstGeom prst="rect">
             <a:avLst/>
           </a:prstGeom>
         </p:spPr>
       </p:pic>
-      <p:sp>
-        <p:nvSpPr>
-          <p:cNvPr id="25" name="TextBox 24">
-            <a:extLst>
-              <a:ext uri="{FF2B5EF4-FFF2-40B4-BE49-F238E27FC236}">
-                <a16:creationId xmlns:a16="http://schemas.microsoft.com/office/drawing/2014/main" id="{6AB834B4-4B67-4E86-9862-7D76F83BBDB4}"/>
-              </a:ext>
-            </a:extLst>
-          </p:cNvPr>
-          <p:cNvSpPr txBox="1"/>
+      <p:pic>
+        <p:nvPicPr>
+          <p:cNvPr id="15" name="Picture 14">
+            <a:extLst>
+              <a:ext uri="{FF2B5EF4-FFF2-40B4-BE49-F238E27FC236}">
+                <a16:creationId xmlns:a16="http://schemas.microsoft.com/office/drawing/2014/main" id="{D6B79F17-D986-4DB6-9BFB-74663855AAD1}"/>
+              </a:ext>
+            </a:extLst>
+          </p:cNvPr>
+          <p:cNvPicPr>
+            <a:picLocks noChangeAspect="1"/>
+          </p:cNvPicPr>
           <p:nvPr/>
-        </p:nvSpPr>
-        <p:spPr>
-          <a:xfrm>
-            <a:off x="7402487" y="947356"/>
-            <a:ext cx="1543747" cy="646331"/>
+        </p:nvPicPr>
+        <p:blipFill>
+          <a:blip r:embed="rId8">
+            <a:extLst>
+              <a:ext uri="{28A0092B-C50C-407E-A947-70E740481C1C}">
+                <a14:useLocalDpi xmlns:a14="http://schemas.microsoft.com/office/drawing/2010/main" val="0"/>
+              </a:ext>
+            </a:extLst>
+          </a:blip>
+          <a:stretch>
+            <a:fillRect/>
+          </a:stretch>
+        </p:blipFill>
+        <p:spPr>
+          <a:xfrm>
+            <a:off x="4724421" y="4262270"/>
+            <a:ext cx="2405016" cy="2405016"/>
           </a:xfrm>
           <a:prstGeom prst="rect">
             <a:avLst/>
           </a:prstGeom>
-          <a:noFill/>
-        </p:spPr>
-        <p:txBody>
-          <a:bodyPr wrap="square" rtlCol="0">
-            <a:spAutoFit/>
-          </a:bodyPr>
-          <a:lstStyle/>
-          <a:p>
-            <a:r>
-              <a:rPr lang="en-CA" dirty="0"/>
-              <a:t>A0=1e8</a:t>
-            </a:r>
-          </a:p>
-          <a:p>
-            <a:r>
-              <a:rPr lang="en-CA" dirty="0" err="1"/>
-              <a:t>dH</a:t>
-            </a:r>
-            <a:r>
-              <a:rPr lang="en-CA" dirty="0"/>
-              <a:t>=1200</a:t>
-            </a:r>
-          </a:p>
-        </p:txBody>
-      </p:sp>
-      <p:sp>
-        <p:nvSpPr>
-          <p:cNvPr id="30" name="TextBox 29">
-            <a:extLst>
-              <a:ext uri="{FF2B5EF4-FFF2-40B4-BE49-F238E27FC236}">
-                <a16:creationId xmlns:a16="http://schemas.microsoft.com/office/drawing/2014/main" id="{C851CC7A-C946-4A94-9666-490E877AADD7}"/>
-              </a:ext>
-            </a:extLst>
-          </p:cNvPr>
-          <p:cNvSpPr txBox="1"/>
-          <p:nvPr/>
-        </p:nvSpPr>
-        <p:spPr>
-          <a:xfrm>
-            <a:off x="9710640" y="947356"/>
-            <a:ext cx="1543747" cy="923330"/>
-          </a:xfrm>
-          <a:prstGeom prst="rect">
-            <a:avLst/>
-          </a:prstGeom>
-          <a:noFill/>
-        </p:spPr>
-        <p:txBody>
-          <a:bodyPr wrap="square" rtlCol="0">
-            <a:spAutoFit/>
-          </a:bodyPr>
-          <a:lstStyle/>
-          <a:p>
-            <a:r>
-              <a:rPr lang="en-CA" dirty="0" err="1"/>
-              <a:t>Ea</a:t>
-            </a:r>
-            <a:r>
-              <a:rPr lang="en-CA" dirty="0"/>
-              <a:t>=4000</a:t>
-            </a:r>
-          </a:p>
-          <a:p>
-            <a:r>
-              <a:rPr lang="en-CA" dirty="0"/>
-              <a:t>A0=1e6</a:t>
-            </a:r>
-          </a:p>
-          <a:p>
-            <a:r>
-              <a:rPr lang="en-CA" dirty="0" err="1"/>
-              <a:t>dH</a:t>
-            </a:r>
-            <a:r>
-              <a:rPr lang="en-CA" dirty="0"/>
-              <a:t>=1200</a:t>
-            </a:r>
-          </a:p>
-        </p:txBody>
-      </p:sp>
-      <p:sp>
-        <p:nvSpPr>
-          <p:cNvPr id="2" name="TextBox 1">
-            <a:extLst>
-              <a:ext uri="{FF2B5EF4-FFF2-40B4-BE49-F238E27FC236}">
-                <a16:creationId xmlns:a16="http://schemas.microsoft.com/office/drawing/2014/main" id="{5997D997-4434-4A2E-96A4-AE5EE799A0DF}"/>
-              </a:ext>
-            </a:extLst>
-          </p:cNvPr>
-          <p:cNvSpPr txBox="1"/>
-          <p:nvPr/>
-        </p:nvSpPr>
-        <p:spPr>
-          <a:xfrm>
-            <a:off x="377505" y="233318"/>
-            <a:ext cx="2176448" cy="369332"/>
-          </a:xfrm>
-          <a:prstGeom prst="rect">
-            <a:avLst/>
-          </a:prstGeom>
-          <a:noFill/>
-        </p:spPr>
-        <p:txBody>
-          <a:bodyPr wrap="square" rtlCol="0">
-            <a:spAutoFit/>
-          </a:bodyPr>
-          <a:lstStyle/>
-          <a:p>
-            <a:r>
-              <a:rPr lang="en-CA" b="1" dirty="0" err="1"/>
-              <a:t>dH</a:t>
-            </a:r>
-            <a:r>
-              <a:rPr lang="en-CA" b="1" dirty="0"/>
-              <a:t> investigations</a:t>
-            </a:r>
-          </a:p>
-        </p:txBody>
-      </p:sp>
+        </p:spPr>
+      </p:pic>
     </p:spTree>
     <p:extLst>
       <p:ext uri="{BB962C8B-B14F-4D97-AF65-F5344CB8AC3E}">
-        <p14:creationId xmlns:p14="http://schemas.microsoft.com/office/powerpoint/2010/main" val="1319909903"/>
+        <p14:creationId xmlns:p14="http://schemas.microsoft.com/office/powerpoint/2010/main" val="570022550"/>
       </p:ext>
     </p:extLst>
   </p:cSld>
@@ -4176,10 +4818,10 @@
       </p:grpSpPr>
       <p:sp>
         <p:nvSpPr>
-          <p:cNvPr id="8" name="TextBox 7">
-            <a:extLst>
-              <a:ext uri="{FF2B5EF4-FFF2-40B4-BE49-F238E27FC236}">
-                <a16:creationId xmlns:a16="http://schemas.microsoft.com/office/drawing/2014/main" id="{FD148865-3CB4-4023-9A0C-5737DE4686A6}"/>
+          <p:cNvPr id="2" name="TextBox 1">
+            <a:extLst>
+              <a:ext uri="{FF2B5EF4-FFF2-40B4-BE49-F238E27FC236}">
+                <a16:creationId xmlns:a16="http://schemas.microsoft.com/office/drawing/2014/main" id="{5997D997-4434-4A2E-96A4-AE5EE799A0DF}"/>
               </a:ext>
             </a:extLst>
           </p:cNvPr>
@@ -4188,8 +4830,8 @@
         </p:nvSpPr>
         <p:spPr>
           <a:xfrm>
-            <a:off x="9722669" y="944874"/>
-            <a:ext cx="1543745" cy="923330"/>
+            <a:off x="377505" y="233318"/>
+            <a:ext cx="2176448" cy="369332"/>
           </a:xfrm>
           <a:prstGeom prst="rect">
             <a:avLst/>
@@ -4203,38 +4845,22 @@
           <a:lstStyle/>
           <a:p>
             <a:r>
-              <a:rPr lang="en-CA" dirty="0" err="1"/>
-              <a:t>Ea</a:t>
-            </a:r>
-            <a:r>
-              <a:rPr lang="en-CA" dirty="0"/>
-              <a:t>=40000</a:t>
-            </a:r>
-          </a:p>
-          <a:p>
-            <a:r>
-              <a:rPr lang="en-CA" dirty="0"/>
-              <a:t>A0=1e8</a:t>
-            </a:r>
-          </a:p>
-          <a:p>
-            <a:r>
-              <a:rPr lang="en-CA" dirty="0" err="1"/>
+              <a:rPr lang="en-CA" b="1" dirty="0" err="1"/>
               <a:t>dH</a:t>
             </a:r>
             <a:r>
-              <a:rPr lang="en-CA" dirty="0"/>
-              <a:t>=300000</a:t>
-            </a:r>
-          </a:p>
-        </p:txBody>
-      </p:sp>
-      <p:sp>
-        <p:nvSpPr>
-          <p:cNvPr id="13" name="TextBox 12">
-            <a:extLst>
-              <a:ext uri="{FF2B5EF4-FFF2-40B4-BE49-F238E27FC236}">
-                <a16:creationId xmlns:a16="http://schemas.microsoft.com/office/drawing/2014/main" id="{45781C38-3052-46B3-BC71-40631ECA081B}"/>
+              <a:rPr lang="en-CA" b="1" dirty="0"/>
+              <a:t> investigations</a:t>
+            </a:r>
+          </a:p>
+        </p:txBody>
+      </p:sp>
+      <p:sp>
+        <p:nvSpPr>
+          <p:cNvPr id="19" name="TextBox 18">
+            <a:extLst>
+              <a:ext uri="{FF2B5EF4-FFF2-40B4-BE49-F238E27FC236}">
+                <a16:creationId xmlns:a16="http://schemas.microsoft.com/office/drawing/2014/main" id="{7C8E886D-5517-43D9-86C3-FAA1D6AD8426}"/>
               </a:ext>
             </a:extLst>
           </p:cNvPr>
@@ -4243,8 +4869,8 @@
         </p:nvSpPr>
         <p:spPr>
           <a:xfrm>
-            <a:off x="3075078" y="953863"/>
-            <a:ext cx="1543746" cy="646331"/>
+            <a:off x="5091314" y="1303524"/>
+            <a:ext cx="1543747" cy="646331"/>
           </a:xfrm>
           <a:prstGeom prst="rect">
             <a:avLst/>
@@ -4259,7 +4885,7 @@
           <a:p>
             <a:r>
               <a:rPr lang="en-CA" dirty="0"/>
-              <a:t>A0=1e6</a:t>
+              <a:t>(3)</a:t>
             </a:r>
           </a:p>
           <a:p>
@@ -4269,17 +4895,17 @@
             </a:r>
             <a:r>
               <a:rPr lang="en-CA" dirty="0"/>
-              <a:t>=300000</a:t>
-            </a:r>
-          </a:p>
-        </p:txBody>
-      </p:sp>
-      <p:sp>
-        <p:nvSpPr>
-          <p:cNvPr id="18" name="TextBox 17">
-            <a:extLst>
-              <a:ext uri="{FF2B5EF4-FFF2-40B4-BE49-F238E27FC236}">
-                <a16:creationId xmlns:a16="http://schemas.microsoft.com/office/drawing/2014/main" id="{41A60E4F-9403-4F24-9ACF-6D8AD40FFCC0}"/>
+              <a:t>=1200</a:t>
+            </a:r>
+          </a:p>
+        </p:txBody>
+      </p:sp>
+      <p:sp>
+        <p:nvSpPr>
+          <p:cNvPr id="26" name="TextBox 25">
+            <a:extLst>
+              <a:ext uri="{FF2B5EF4-FFF2-40B4-BE49-F238E27FC236}">
+                <a16:creationId xmlns:a16="http://schemas.microsoft.com/office/drawing/2014/main" id="{4E806EE4-177C-43CB-A4D0-B204687C4442}"/>
               </a:ext>
             </a:extLst>
           </p:cNvPr>
@@ -4288,7 +4914,7 @@
         </p:nvSpPr>
         <p:spPr>
           <a:xfrm>
-            <a:off x="5259754" y="972524"/>
+            <a:off x="2888171" y="1257501"/>
             <a:ext cx="1543747" cy="646331"/>
           </a:xfrm>
           <a:prstGeom prst="rect">
@@ -4304,7 +4930,7 @@
           <a:p>
             <a:r>
               <a:rPr lang="en-CA" dirty="0"/>
-              <a:t>A0=1e6</a:t>
+              <a:t>(2)</a:t>
             </a:r>
           </a:p>
           <a:p>
@@ -4314,98 +4940,17 @@
             </a:r>
             <a:r>
               <a:rPr lang="en-CA" dirty="0"/>
-              <a:t>=1200</a:t>
-            </a:r>
-          </a:p>
-        </p:txBody>
-      </p:sp>
-      <p:sp>
-        <p:nvSpPr>
-          <p:cNvPr id="25" name="TextBox 24">
-            <a:extLst>
-              <a:ext uri="{FF2B5EF4-FFF2-40B4-BE49-F238E27FC236}">
-                <a16:creationId xmlns:a16="http://schemas.microsoft.com/office/drawing/2014/main" id="{6AB834B4-4B67-4E86-9862-7D76F83BBDB4}"/>
-              </a:ext>
-            </a:extLst>
-          </p:cNvPr>
-          <p:cNvSpPr txBox="1"/>
-          <p:nvPr/>
-        </p:nvSpPr>
-        <p:spPr>
-          <a:xfrm>
-            <a:off x="7410876" y="972524"/>
-            <a:ext cx="1543747" cy="646331"/>
-          </a:xfrm>
-          <a:prstGeom prst="rect">
-            <a:avLst/>
-          </a:prstGeom>
-          <a:noFill/>
-        </p:spPr>
-        <p:txBody>
-          <a:bodyPr wrap="square" rtlCol="0">
-            <a:spAutoFit/>
-          </a:bodyPr>
-          <a:lstStyle/>
-          <a:p>
-            <a:r>
-              <a:rPr lang="en-CA" dirty="0"/>
-              <a:t>A0=1e8</a:t>
-            </a:r>
-          </a:p>
-          <a:p>
-            <a:r>
-              <a:rPr lang="en-CA" dirty="0" err="1"/>
-              <a:t>dH</a:t>
-            </a:r>
-            <a:r>
-              <a:rPr lang="en-CA" dirty="0"/>
-              <a:t>=1200</a:t>
+              <a:t>=30000</a:t>
             </a:r>
           </a:p>
         </p:txBody>
       </p:sp>
       <p:pic>
         <p:nvPicPr>
-          <p:cNvPr id="27" name="Picture 26">
-            <a:extLst>
-              <a:ext uri="{FF2B5EF4-FFF2-40B4-BE49-F238E27FC236}">
-                <a16:creationId xmlns:a16="http://schemas.microsoft.com/office/drawing/2014/main" id="{8D48F89D-8CE0-42C8-89A7-C9BB9BEA459F}"/>
-              </a:ext>
-            </a:extLst>
-          </p:cNvPr>
-          <p:cNvPicPr>
-            <a:picLocks noChangeAspect="1"/>
-          </p:cNvPicPr>
-          <p:nvPr/>
-        </p:nvPicPr>
-        <p:blipFill>
-          <a:blip r:embed="rId2">
-            <a:extLst>
-              <a:ext uri="{28A0092B-C50C-407E-A947-70E740481C1C}">
-                <a14:useLocalDpi xmlns:a14="http://schemas.microsoft.com/office/drawing/2010/main" val="0"/>
-              </a:ext>
-            </a:extLst>
-          </a:blip>
-          <a:stretch>
-            <a:fillRect/>
-          </a:stretch>
-        </p:blipFill>
-        <p:spPr>
-          <a:xfrm>
-            <a:off x="373092" y="1868204"/>
-            <a:ext cx="2405016" cy="2405016"/>
-          </a:xfrm>
-          <a:prstGeom prst="rect">
-            <a:avLst/>
-          </a:prstGeom>
-        </p:spPr>
-      </p:pic>
-      <p:pic>
-        <p:nvPicPr>
-          <p:cNvPr id="29" name="Picture 28">
-            <a:extLst>
-              <a:ext uri="{FF2B5EF4-FFF2-40B4-BE49-F238E27FC236}">
-                <a16:creationId xmlns:a16="http://schemas.microsoft.com/office/drawing/2014/main" id="{9C0DE114-27D4-4B7C-87E8-4586C8302E0B}"/>
+          <p:cNvPr id="31" name="Picture 30">
+            <a:extLst>
+              <a:ext uri="{FF2B5EF4-FFF2-40B4-BE49-F238E27FC236}">
+                <a16:creationId xmlns:a16="http://schemas.microsoft.com/office/drawing/2014/main" id="{B2477E16-39A4-4C0C-8843-0A286198933B}"/>
               </a:ext>
             </a:extLst>
           </p:cNvPr>
@@ -4428,7 +4973,7 @@
         </p:blipFill>
         <p:spPr>
           <a:xfrm>
-            <a:off x="373092" y="4144880"/>
+            <a:off x="302815" y="1974853"/>
             <a:ext cx="2405016" cy="2405016"/>
           </a:xfrm>
           <a:prstGeom prst="rect">
@@ -4436,12 +4981,48 @@
           </a:prstGeom>
         </p:spPr>
       </p:pic>
-      <p:sp>
-        <p:nvSpPr>
-          <p:cNvPr id="30" name="TextBox 29">
-            <a:extLst>
-              <a:ext uri="{FF2B5EF4-FFF2-40B4-BE49-F238E27FC236}">
-                <a16:creationId xmlns:a16="http://schemas.microsoft.com/office/drawing/2014/main" id="{C851CC7A-C946-4A94-9666-490E877AADD7}"/>
+      <p:pic>
+        <p:nvPicPr>
+          <p:cNvPr id="32" name="Picture 31">
+            <a:extLst>
+              <a:ext uri="{FF2B5EF4-FFF2-40B4-BE49-F238E27FC236}">
+                <a16:creationId xmlns:a16="http://schemas.microsoft.com/office/drawing/2014/main" id="{F8CDE8FC-F34D-4206-A585-64D5DA0D8EA2}"/>
+              </a:ext>
+            </a:extLst>
+          </p:cNvPr>
+          <p:cNvPicPr>
+            <a:picLocks noChangeAspect="1"/>
+          </p:cNvPicPr>
+          <p:nvPr/>
+        </p:nvPicPr>
+        <p:blipFill>
+          <a:blip r:embed="rId4">
+            <a:extLst>
+              <a:ext uri="{28A0092B-C50C-407E-A947-70E740481C1C}">
+                <a14:useLocalDpi xmlns:a14="http://schemas.microsoft.com/office/drawing/2010/main" val="0"/>
+              </a:ext>
+            </a:extLst>
+          </a:blip>
+          <a:stretch>
+            <a:fillRect/>
+          </a:stretch>
+        </p:blipFill>
+        <p:spPr>
+          <a:xfrm>
+            <a:off x="302816" y="4262270"/>
+            <a:ext cx="2405016" cy="2405016"/>
+          </a:xfrm>
+          <a:prstGeom prst="rect">
+            <a:avLst/>
+          </a:prstGeom>
+        </p:spPr>
+      </p:pic>
+      <p:sp>
+        <p:nvSpPr>
+          <p:cNvPr id="33" name="TextBox 32">
+            <a:extLst>
+              <a:ext uri="{FF2B5EF4-FFF2-40B4-BE49-F238E27FC236}">
+                <a16:creationId xmlns:a16="http://schemas.microsoft.com/office/drawing/2014/main" id="{F1C7C7F7-F253-4318-B168-A3A322B93CB9}"/>
               </a:ext>
             </a:extLst>
           </p:cNvPr>
@@ -4450,8 +5031,8 @@
         </p:nvSpPr>
         <p:spPr>
           <a:xfrm>
-            <a:off x="763285" y="944874"/>
-            <a:ext cx="1543747" cy="923330"/>
+            <a:off x="588250" y="806372"/>
+            <a:ext cx="1543745" cy="1200329"/>
           </a:xfrm>
           <a:prstGeom prst="rect">
             <a:avLst/>
@@ -4465,18 +5046,24 @@
           <a:lstStyle/>
           <a:p>
             <a:r>
+              <a:rPr lang="en-CA" dirty="0"/>
+              <a:t>(1)</a:t>
+            </a:r>
+          </a:p>
+          <a:p>
+            <a:r>
               <a:rPr lang="en-CA" dirty="0" err="1"/>
               <a:t>Ea</a:t>
             </a:r>
             <a:r>
               <a:rPr lang="en-CA" dirty="0"/>
-              <a:t>=4000</a:t>
+              <a:t>=40000</a:t>
             </a:r>
           </a:p>
           <a:p>
             <a:r>
               <a:rPr lang="en-CA" dirty="0"/>
-              <a:t>A0=1e6</a:t>
+              <a:t>A0=1e8</a:t>
             </a:r>
           </a:p>
           <a:p>
@@ -4486,54 +5073,159 @@
             </a:r>
             <a:r>
               <a:rPr lang="en-CA" dirty="0"/>
-              <a:t>=1200</a:t>
-            </a:r>
-          </a:p>
-        </p:txBody>
-      </p:sp>
-      <p:sp>
-        <p:nvSpPr>
-          <p:cNvPr id="9" name="TextBox 8">
-            <a:extLst>
-              <a:ext uri="{FF2B5EF4-FFF2-40B4-BE49-F238E27FC236}">
-                <a16:creationId xmlns:a16="http://schemas.microsoft.com/office/drawing/2014/main" id="{41A3C277-5DAA-4D2F-A5CA-FC7C758FC832}"/>
-              </a:ext>
-            </a:extLst>
-          </p:cNvPr>
-          <p:cNvSpPr txBox="1"/>
+              <a:t>=300000</a:t>
+            </a:r>
+          </a:p>
+        </p:txBody>
+      </p:sp>
+      <p:pic>
+        <p:nvPicPr>
+          <p:cNvPr id="35" name="Picture 34">
+            <a:extLst>
+              <a:ext uri="{FF2B5EF4-FFF2-40B4-BE49-F238E27FC236}">
+                <a16:creationId xmlns:a16="http://schemas.microsoft.com/office/drawing/2014/main" id="{99779802-F64E-4FC8-85C3-B921B7E59E48}"/>
+              </a:ext>
+            </a:extLst>
+          </p:cNvPr>
+          <p:cNvPicPr>
+            <a:picLocks noChangeAspect="1"/>
+          </p:cNvPicPr>
           <p:nvPr/>
-        </p:nvSpPr>
-        <p:spPr>
-          <a:xfrm>
-            <a:off x="377505" y="233318"/>
-            <a:ext cx="2176448" cy="369332"/>
+        </p:nvPicPr>
+        <p:blipFill>
+          <a:blip r:embed="rId5">
+            <a:extLst>
+              <a:ext uri="{28A0092B-C50C-407E-A947-70E740481C1C}">
+                <a14:useLocalDpi xmlns:a14="http://schemas.microsoft.com/office/drawing/2010/main" val="0"/>
+              </a:ext>
+            </a:extLst>
+          </a:blip>
+          <a:stretch>
+            <a:fillRect/>
+          </a:stretch>
+        </p:blipFill>
+        <p:spPr>
+          <a:xfrm>
+            <a:off x="4612256" y="1969611"/>
+            <a:ext cx="2405016" cy="2405016"/>
           </a:xfrm>
           <a:prstGeom prst="rect">
             <a:avLst/>
           </a:prstGeom>
-          <a:noFill/>
-        </p:spPr>
-        <p:txBody>
-          <a:bodyPr wrap="square" rtlCol="0">
-            <a:spAutoFit/>
-          </a:bodyPr>
-          <a:lstStyle/>
-          <a:p>
-            <a:r>
-              <a:rPr lang="en-CA" b="1" dirty="0" err="1"/>
-              <a:t>Ea</a:t>
-            </a:r>
-            <a:r>
-              <a:rPr lang="en-CA" b="1" dirty="0"/>
-              <a:t> investigations</a:t>
-            </a:r>
-          </a:p>
-        </p:txBody>
-      </p:sp>
+        </p:spPr>
+      </p:pic>
+      <p:pic>
+        <p:nvPicPr>
+          <p:cNvPr id="37" name="Picture 36">
+            <a:extLst>
+              <a:ext uri="{FF2B5EF4-FFF2-40B4-BE49-F238E27FC236}">
+                <a16:creationId xmlns:a16="http://schemas.microsoft.com/office/drawing/2014/main" id="{89F3D24B-B7A6-46F8-88E1-8608C35F8037}"/>
+              </a:ext>
+            </a:extLst>
+          </p:cNvPr>
+          <p:cNvPicPr>
+            <a:picLocks noChangeAspect="1"/>
+          </p:cNvPicPr>
+          <p:nvPr/>
+        </p:nvPicPr>
+        <p:blipFill>
+          <a:blip r:embed="rId6">
+            <a:extLst>
+              <a:ext uri="{28A0092B-C50C-407E-A947-70E740481C1C}">
+                <a14:useLocalDpi xmlns:a14="http://schemas.microsoft.com/office/drawing/2010/main" val="0"/>
+              </a:ext>
+            </a:extLst>
+          </a:blip>
+          <a:stretch>
+            <a:fillRect/>
+          </a:stretch>
+        </p:blipFill>
+        <p:spPr>
+          <a:xfrm>
+            <a:off x="4612256" y="4272754"/>
+            <a:ext cx="2405016" cy="2405016"/>
+          </a:xfrm>
+          <a:prstGeom prst="rect">
+            <a:avLst/>
+          </a:prstGeom>
+        </p:spPr>
+      </p:pic>
+      <p:pic>
+        <p:nvPicPr>
+          <p:cNvPr id="39" name="Picture 38">
+            <a:extLst>
+              <a:ext uri="{FF2B5EF4-FFF2-40B4-BE49-F238E27FC236}">
+                <a16:creationId xmlns:a16="http://schemas.microsoft.com/office/drawing/2014/main" id="{D827241F-D40D-4130-A667-4C99E24B82FA}"/>
+              </a:ext>
+            </a:extLst>
+          </p:cNvPr>
+          <p:cNvPicPr>
+            <a:picLocks noChangeAspect="1"/>
+          </p:cNvPicPr>
+          <p:nvPr/>
+        </p:nvPicPr>
+        <p:blipFill>
+          <a:blip r:embed="rId7">
+            <a:extLst>
+              <a:ext uri="{28A0092B-C50C-407E-A947-70E740481C1C}">
+                <a14:useLocalDpi xmlns:a14="http://schemas.microsoft.com/office/drawing/2010/main" val="0"/>
+              </a:ext>
+            </a:extLst>
+          </a:blip>
+          <a:stretch>
+            <a:fillRect/>
+          </a:stretch>
+        </p:blipFill>
+        <p:spPr>
+          <a:xfrm>
+            <a:off x="2457536" y="1969611"/>
+            <a:ext cx="2405016" cy="2405016"/>
+          </a:xfrm>
+          <a:prstGeom prst="rect">
+            <a:avLst/>
+          </a:prstGeom>
+        </p:spPr>
+      </p:pic>
+      <p:pic>
+        <p:nvPicPr>
+          <p:cNvPr id="41" name="Picture 40">
+            <a:extLst>
+              <a:ext uri="{FF2B5EF4-FFF2-40B4-BE49-F238E27FC236}">
+                <a16:creationId xmlns:a16="http://schemas.microsoft.com/office/drawing/2014/main" id="{8D0856DD-F4A0-44A6-9F2F-E5DF3315E818}"/>
+              </a:ext>
+            </a:extLst>
+          </p:cNvPr>
+          <p:cNvPicPr>
+            <a:picLocks noChangeAspect="1"/>
+          </p:cNvPicPr>
+          <p:nvPr/>
+        </p:nvPicPr>
+        <p:blipFill>
+          <a:blip r:embed="rId8">
+            <a:extLst>
+              <a:ext uri="{28A0092B-C50C-407E-A947-70E740481C1C}">
+                <a14:useLocalDpi xmlns:a14="http://schemas.microsoft.com/office/drawing/2010/main" val="0"/>
+              </a:ext>
+            </a:extLst>
+          </a:blip>
+          <a:stretch>
+            <a:fillRect/>
+          </a:stretch>
+        </p:blipFill>
+        <p:spPr>
+          <a:xfrm>
+            <a:off x="2457536" y="4267512"/>
+            <a:ext cx="2405016" cy="2405016"/>
+          </a:xfrm>
+          <a:prstGeom prst="rect">
+            <a:avLst/>
+          </a:prstGeom>
+        </p:spPr>
+      </p:pic>
     </p:spTree>
     <p:extLst>
       <p:ext uri="{BB962C8B-B14F-4D97-AF65-F5344CB8AC3E}">
-        <p14:creationId xmlns:p14="http://schemas.microsoft.com/office/powerpoint/2010/main" val="570022550"/>
+        <p14:creationId xmlns:p14="http://schemas.microsoft.com/office/powerpoint/2010/main" val="1319909903"/>
       </p:ext>
     </p:extLst>
   </p:cSld>
@@ -4562,10 +5254,10 @@
       </p:grpSpPr>
       <p:sp>
         <p:nvSpPr>
-          <p:cNvPr id="8" name="TextBox 7">
-            <a:extLst>
-              <a:ext uri="{FF2B5EF4-FFF2-40B4-BE49-F238E27FC236}">
-                <a16:creationId xmlns:a16="http://schemas.microsoft.com/office/drawing/2014/main" id="{FD148865-3CB4-4023-9A0C-5737DE4686A6}"/>
+          <p:cNvPr id="11" name="TextBox 10">
+            <a:extLst>
+              <a:ext uri="{FF2B5EF4-FFF2-40B4-BE49-F238E27FC236}">
+                <a16:creationId xmlns:a16="http://schemas.microsoft.com/office/drawing/2014/main" id="{7221CF27-ED12-4FDC-9F99-CFD2159FBEB0}"/>
               </a:ext>
             </a:extLst>
           </p:cNvPr>
@@ -4574,8 +5266,8 @@
         </p:nvSpPr>
         <p:spPr>
           <a:xfrm>
-            <a:off x="9890449" y="894540"/>
-            <a:ext cx="1543745" cy="923330"/>
+            <a:off x="377505" y="233318"/>
+            <a:ext cx="2176448" cy="369332"/>
           </a:xfrm>
           <a:prstGeom prst="rect">
             <a:avLst/>
@@ -4589,264 +5281,18 @@
           <a:lstStyle/>
           <a:p>
             <a:r>
-              <a:rPr lang="en-CA" dirty="0" err="1"/>
-              <a:t>Ea</a:t>
-            </a:r>
-            <a:r>
-              <a:rPr lang="en-CA" dirty="0"/>
-              <a:t>=40000</a:t>
-            </a:r>
-          </a:p>
-          <a:p>
-            <a:r>
-              <a:rPr lang="en-CA" dirty="0"/>
-              <a:t>A0=1e8</a:t>
-            </a:r>
-          </a:p>
-          <a:p>
-            <a:r>
-              <a:rPr lang="en-CA" dirty="0" err="1"/>
-              <a:t>dH</a:t>
-            </a:r>
-            <a:r>
-              <a:rPr lang="en-CA" dirty="0"/>
-              <a:t>=300000</a:t>
-            </a:r>
-          </a:p>
-        </p:txBody>
-      </p:sp>
-      <p:sp>
-        <p:nvSpPr>
-          <p:cNvPr id="13" name="TextBox 12">
-            <a:extLst>
-              <a:ext uri="{FF2B5EF4-FFF2-40B4-BE49-F238E27FC236}">
-                <a16:creationId xmlns:a16="http://schemas.microsoft.com/office/drawing/2014/main" id="{45781C38-3052-46B3-BC71-40631ECA081B}"/>
-              </a:ext>
-            </a:extLst>
-          </p:cNvPr>
-          <p:cNvSpPr txBox="1"/>
-          <p:nvPr/>
-        </p:nvSpPr>
-        <p:spPr>
-          <a:xfrm>
-            <a:off x="3242858" y="903529"/>
-            <a:ext cx="1543746" cy="646331"/>
-          </a:xfrm>
-          <a:prstGeom prst="rect">
-            <a:avLst/>
-          </a:prstGeom>
-          <a:noFill/>
-        </p:spPr>
-        <p:txBody>
-          <a:bodyPr wrap="square" rtlCol="0">
-            <a:spAutoFit/>
-          </a:bodyPr>
-          <a:lstStyle/>
-          <a:p>
-            <a:r>
-              <a:rPr lang="en-CA" dirty="0"/>
-              <a:t>A0=1e6</a:t>
-            </a:r>
-          </a:p>
-          <a:p>
-            <a:r>
-              <a:rPr lang="en-CA" dirty="0" err="1"/>
-              <a:t>dH</a:t>
-            </a:r>
-            <a:r>
-              <a:rPr lang="en-CA" dirty="0"/>
-              <a:t>=300000</a:t>
-            </a:r>
-          </a:p>
-        </p:txBody>
-      </p:sp>
-      <p:sp>
-        <p:nvSpPr>
-          <p:cNvPr id="18" name="TextBox 17">
-            <a:extLst>
-              <a:ext uri="{FF2B5EF4-FFF2-40B4-BE49-F238E27FC236}">
-                <a16:creationId xmlns:a16="http://schemas.microsoft.com/office/drawing/2014/main" id="{41A60E4F-9403-4F24-9ACF-6D8AD40FFCC0}"/>
-              </a:ext>
-            </a:extLst>
-          </p:cNvPr>
-          <p:cNvSpPr txBox="1"/>
-          <p:nvPr/>
-        </p:nvSpPr>
-        <p:spPr>
-          <a:xfrm>
-            <a:off x="5427534" y="922190"/>
-            <a:ext cx="1543747" cy="646331"/>
-          </a:xfrm>
-          <a:prstGeom prst="rect">
-            <a:avLst/>
-          </a:prstGeom>
-          <a:noFill/>
-        </p:spPr>
-        <p:txBody>
-          <a:bodyPr wrap="square" rtlCol="0">
-            <a:spAutoFit/>
-          </a:bodyPr>
-          <a:lstStyle/>
-          <a:p>
-            <a:r>
-              <a:rPr lang="en-CA" dirty="0"/>
-              <a:t>A0=1e6</a:t>
-            </a:r>
-          </a:p>
-          <a:p>
-            <a:r>
-              <a:rPr lang="en-CA" dirty="0" err="1"/>
-              <a:t>dH</a:t>
-            </a:r>
-            <a:r>
-              <a:rPr lang="en-CA" dirty="0"/>
-              <a:t>=1200</a:t>
-            </a:r>
-          </a:p>
-        </p:txBody>
-      </p:sp>
-      <p:sp>
-        <p:nvSpPr>
-          <p:cNvPr id="25" name="TextBox 24">
-            <a:extLst>
-              <a:ext uri="{FF2B5EF4-FFF2-40B4-BE49-F238E27FC236}">
-                <a16:creationId xmlns:a16="http://schemas.microsoft.com/office/drawing/2014/main" id="{6AB834B4-4B67-4E86-9862-7D76F83BBDB4}"/>
-              </a:ext>
-            </a:extLst>
-          </p:cNvPr>
-          <p:cNvSpPr txBox="1"/>
-          <p:nvPr/>
-        </p:nvSpPr>
-        <p:spPr>
-          <a:xfrm>
-            <a:off x="7578656" y="922190"/>
-            <a:ext cx="1543747" cy="646331"/>
-          </a:xfrm>
-          <a:prstGeom prst="rect">
-            <a:avLst/>
-          </a:prstGeom>
-          <a:noFill/>
-        </p:spPr>
-        <p:txBody>
-          <a:bodyPr wrap="square" rtlCol="0">
-            <a:spAutoFit/>
-          </a:bodyPr>
-          <a:lstStyle/>
-          <a:p>
-            <a:r>
-              <a:rPr lang="en-CA" dirty="0"/>
-              <a:t>A0=1e8</a:t>
-            </a:r>
-          </a:p>
-          <a:p>
-            <a:r>
-              <a:rPr lang="en-CA" dirty="0" err="1"/>
-              <a:t>dH</a:t>
-            </a:r>
-            <a:r>
-              <a:rPr lang="en-CA" dirty="0"/>
-              <a:t>=1200</a:t>
-            </a:r>
-          </a:p>
-        </p:txBody>
-      </p:sp>
-      <p:sp>
-        <p:nvSpPr>
-          <p:cNvPr id="30" name="TextBox 29">
-            <a:extLst>
-              <a:ext uri="{FF2B5EF4-FFF2-40B4-BE49-F238E27FC236}">
-                <a16:creationId xmlns:a16="http://schemas.microsoft.com/office/drawing/2014/main" id="{C851CC7A-C946-4A94-9666-490E877AADD7}"/>
-              </a:ext>
-            </a:extLst>
-          </p:cNvPr>
-          <p:cNvSpPr txBox="1"/>
-          <p:nvPr/>
-        </p:nvSpPr>
-        <p:spPr>
-          <a:xfrm>
-            <a:off x="931065" y="894540"/>
-            <a:ext cx="1543747" cy="923330"/>
-          </a:xfrm>
-          <a:prstGeom prst="rect">
-            <a:avLst/>
-          </a:prstGeom>
-          <a:noFill/>
-        </p:spPr>
-        <p:txBody>
-          <a:bodyPr wrap="square" rtlCol="0">
-            <a:spAutoFit/>
-          </a:bodyPr>
-          <a:lstStyle/>
-          <a:p>
-            <a:r>
-              <a:rPr lang="en-CA" dirty="0" err="1"/>
-              <a:t>Ea</a:t>
-            </a:r>
-            <a:r>
-              <a:rPr lang="en-CA" dirty="0"/>
-              <a:t>=40000</a:t>
-            </a:r>
-          </a:p>
-          <a:p>
-            <a:r>
-              <a:rPr lang="en-CA" dirty="0"/>
-              <a:t>A0=1e6</a:t>
-            </a:r>
-          </a:p>
-          <a:p>
-            <a:r>
-              <a:rPr lang="en-CA" dirty="0" err="1"/>
-              <a:t>dH</a:t>
-            </a:r>
-            <a:r>
-              <a:rPr lang="en-CA" dirty="0"/>
-              <a:t>=1200</a:t>
+              <a:rPr lang="en-CA" b="1" dirty="0"/>
+              <a:t>A0 investigations</a:t>
             </a:r>
           </a:p>
         </p:txBody>
       </p:sp>
       <p:pic>
         <p:nvPicPr>
-          <p:cNvPr id="9" name="Picture 8">
-            <a:extLst>
-              <a:ext uri="{FF2B5EF4-FFF2-40B4-BE49-F238E27FC236}">
-                <a16:creationId xmlns:a16="http://schemas.microsoft.com/office/drawing/2014/main" id="{AB89DCEC-9D9C-48DB-BA0D-4FA39BDC2A46}"/>
-              </a:ext>
-            </a:extLst>
-          </p:cNvPr>
-          <p:cNvPicPr>
-            <a:picLocks noChangeAspect="1"/>
-          </p:cNvPicPr>
-          <p:nvPr/>
-        </p:nvPicPr>
-        <p:blipFill>
-          <a:blip r:embed="rId2">
-            <a:extLst>
-              <a:ext uri="{28A0092B-C50C-407E-A947-70E740481C1C}">
-                <a14:useLocalDpi xmlns:a14="http://schemas.microsoft.com/office/drawing/2010/main" val="0"/>
-              </a:ext>
-            </a:extLst>
-          </a:blip>
-          <a:stretch>
-            <a:fillRect/>
-          </a:stretch>
-        </p:blipFill>
-        <p:spPr>
-          <a:xfrm>
-            <a:off x="341010" y="1817870"/>
-            <a:ext cx="2405017" cy="2405017"/>
-          </a:xfrm>
-          <a:prstGeom prst="rect">
-            <a:avLst/>
-          </a:prstGeom>
-        </p:spPr>
-      </p:pic>
-      <p:pic>
-        <p:nvPicPr>
-          <p:cNvPr id="10" name="Picture 9">
-            <a:extLst>
-              <a:ext uri="{FF2B5EF4-FFF2-40B4-BE49-F238E27FC236}">
-                <a16:creationId xmlns:a16="http://schemas.microsoft.com/office/drawing/2014/main" id="{4E5F7F04-06EB-4E8B-ACFA-F31FA2B260F3}"/>
+          <p:cNvPr id="12" name="Picture 11">
+            <a:extLst>
+              <a:ext uri="{FF2B5EF4-FFF2-40B4-BE49-F238E27FC236}">
+                <a16:creationId xmlns:a16="http://schemas.microsoft.com/office/drawing/2014/main" id="{0CF74F51-BCD1-4328-8307-CE91032F0174}"/>
               </a:ext>
             </a:extLst>
           </p:cNvPr>
@@ -4869,20 +5315,56 @@
         </p:blipFill>
         <p:spPr>
           <a:xfrm>
-            <a:off x="341010" y="4094544"/>
-            <a:ext cx="2405017" cy="2405017"/>
+            <a:off x="215798" y="1913926"/>
+            <a:ext cx="2405016" cy="2405016"/>
           </a:xfrm>
           <a:prstGeom prst="rect">
             <a:avLst/>
           </a:prstGeom>
         </p:spPr>
       </p:pic>
-      <p:sp>
-        <p:nvSpPr>
-          <p:cNvPr id="11" name="TextBox 10">
-            <a:extLst>
-              <a:ext uri="{FF2B5EF4-FFF2-40B4-BE49-F238E27FC236}">
-                <a16:creationId xmlns:a16="http://schemas.microsoft.com/office/drawing/2014/main" id="{7221CF27-ED12-4FDC-9F99-CFD2159FBEB0}"/>
+      <p:pic>
+        <p:nvPicPr>
+          <p:cNvPr id="14" name="Picture 13">
+            <a:extLst>
+              <a:ext uri="{FF2B5EF4-FFF2-40B4-BE49-F238E27FC236}">
+                <a16:creationId xmlns:a16="http://schemas.microsoft.com/office/drawing/2014/main" id="{5E5CE258-E5C3-4188-949E-F146798E3346}"/>
+              </a:ext>
+            </a:extLst>
+          </p:cNvPr>
+          <p:cNvPicPr>
+            <a:picLocks noChangeAspect="1"/>
+          </p:cNvPicPr>
+          <p:nvPr/>
+        </p:nvPicPr>
+        <p:blipFill>
+          <a:blip r:embed="rId4">
+            <a:extLst>
+              <a:ext uri="{28A0092B-C50C-407E-A947-70E740481C1C}">
+                <a14:useLocalDpi xmlns:a14="http://schemas.microsoft.com/office/drawing/2010/main" val="0"/>
+              </a:ext>
+            </a:extLst>
+          </a:blip>
+          <a:stretch>
+            <a:fillRect/>
+          </a:stretch>
+        </p:blipFill>
+        <p:spPr>
+          <a:xfrm>
+            <a:off x="215799" y="4201343"/>
+            <a:ext cx="2405016" cy="2405016"/>
+          </a:xfrm>
+          <a:prstGeom prst="rect">
+            <a:avLst/>
+          </a:prstGeom>
+        </p:spPr>
+      </p:pic>
+      <p:sp>
+        <p:nvSpPr>
+          <p:cNvPr id="15" name="TextBox 14">
+            <a:extLst>
+              <a:ext uri="{FF2B5EF4-FFF2-40B4-BE49-F238E27FC236}">
+                <a16:creationId xmlns:a16="http://schemas.microsoft.com/office/drawing/2014/main" id="{35C5247C-59EE-49EF-8145-4A032995571E}"/>
               </a:ext>
             </a:extLst>
           </p:cNvPr>
@@ -4891,8 +5373,8 @@
         </p:nvSpPr>
         <p:spPr>
           <a:xfrm>
-            <a:off x="377505" y="233318"/>
-            <a:ext cx="2176448" cy="369332"/>
+            <a:off x="496832" y="754582"/>
+            <a:ext cx="1543745" cy="1200329"/>
           </a:xfrm>
           <a:prstGeom prst="rect">
             <a:avLst/>
@@ -4906,12 +5388,264 @@
           <a:lstStyle/>
           <a:p>
             <a:r>
-              <a:rPr lang="en-CA" b="1" dirty="0"/>
-              <a:t>A0 investigations</a:t>
-            </a:r>
-          </a:p>
-        </p:txBody>
-      </p:sp>
+              <a:rPr lang="en-CA" dirty="0"/>
+              <a:t>(1)</a:t>
+            </a:r>
+          </a:p>
+          <a:p>
+            <a:r>
+              <a:rPr lang="en-CA" dirty="0" err="1"/>
+              <a:t>Ea</a:t>
+            </a:r>
+            <a:r>
+              <a:rPr lang="en-CA" dirty="0"/>
+              <a:t>=40000</a:t>
+            </a:r>
+          </a:p>
+          <a:p>
+            <a:r>
+              <a:rPr lang="en-CA" dirty="0"/>
+              <a:t>A0=1e8</a:t>
+            </a:r>
+          </a:p>
+          <a:p>
+            <a:r>
+              <a:rPr lang="en-CA" dirty="0" err="1"/>
+              <a:t>dH</a:t>
+            </a:r>
+            <a:r>
+              <a:rPr lang="en-CA" dirty="0"/>
+              <a:t>=300000</a:t>
+            </a:r>
+          </a:p>
+        </p:txBody>
+      </p:sp>
+      <p:pic>
+        <p:nvPicPr>
+          <p:cNvPr id="16" name="Picture 15">
+            <a:extLst>
+              <a:ext uri="{FF2B5EF4-FFF2-40B4-BE49-F238E27FC236}">
+                <a16:creationId xmlns:a16="http://schemas.microsoft.com/office/drawing/2014/main" id="{99F09C27-4E66-4490-BE4A-117FB5F2E648}"/>
+              </a:ext>
+            </a:extLst>
+          </p:cNvPr>
+          <p:cNvPicPr>
+            <a:picLocks noChangeAspect="1"/>
+          </p:cNvPicPr>
+          <p:nvPr/>
+        </p:nvPicPr>
+        <p:blipFill>
+          <a:blip r:embed="rId5">
+            <a:extLst>
+              <a:ext uri="{28A0092B-C50C-407E-A947-70E740481C1C}">
+                <a14:useLocalDpi xmlns:a14="http://schemas.microsoft.com/office/drawing/2010/main" val="0"/>
+              </a:ext>
+            </a:extLst>
+          </a:blip>
+          <a:stretch>
+            <a:fillRect/>
+          </a:stretch>
+        </p:blipFill>
+        <p:spPr>
+          <a:xfrm>
+            <a:off x="4532596" y="1899756"/>
+            <a:ext cx="2405016" cy="2405016"/>
+          </a:xfrm>
+          <a:prstGeom prst="rect">
+            <a:avLst/>
+          </a:prstGeom>
+        </p:spPr>
+      </p:pic>
+      <p:pic>
+        <p:nvPicPr>
+          <p:cNvPr id="17" name="Picture 16">
+            <a:extLst>
+              <a:ext uri="{FF2B5EF4-FFF2-40B4-BE49-F238E27FC236}">
+                <a16:creationId xmlns:a16="http://schemas.microsoft.com/office/drawing/2014/main" id="{C0DD42A5-592A-475B-8707-93BB64287D74}"/>
+              </a:ext>
+            </a:extLst>
+          </p:cNvPr>
+          <p:cNvPicPr>
+            <a:picLocks noChangeAspect="1"/>
+          </p:cNvPicPr>
+          <p:nvPr/>
+        </p:nvPicPr>
+        <p:blipFill>
+          <a:blip r:embed="rId6">
+            <a:extLst>
+              <a:ext uri="{28A0092B-C50C-407E-A947-70E740481C1C}">
+                <a14:useLocalDpi xmlns:a14="http://schemas.microsoft.com/office/drawing/2010/main" val="0"/>
+              </a:ext>
+            </a:extLst>
+          </a:blip>
+          <a:stretch>
+            <a:fillRect/>
+          </a:stretch>
+        </p:blipFill>
+        <p:spPr>
+          <a:xfrm>
+            <a:off x="4535640" y="4318942"/>
+            <a:ext cx="2405016" cy="2405016"/>
+          </a:xfrm>
+          <a:prstGeom prst="rect">
+            <a:avLst/>
+          </a:prstGeom>
+        </p:spPr>
+      </p:pic>
+      <p:sp>
+        <p:nvSpPr>
+          <p:cNvPr id="19" name="TextBox 18">
+            <a:extLst>
+              <a:ext uri="{FF2B5EF4-FFF2-40B4-BE49-F238E27FC236}">
+                <a16:creationId xmlns:a16="http://schemas.microsoft.com/office/drawing/2014/main" id="{494E9D02-B5B5-4DED-86BB-06287B368FBA}"/>
+              </a:ext>
+            </a:extLst>
+          </p:cNvPr>
+          <p:cNvSpPr txBox="1"/>
+          <p:nvPr/>
+        </p:nvSpPr>
+        <p:spPr>
+          <a:xfrm>
+            <a:off x="5094611" y="1031580"/>
+            <a:ext cx="1280986" cy="646331"/>
+          </a:xfrm>
+          <a:prstGeom prst="rect">
+            <a:avLst/>
+          </a:prstGeom>
+          <a:noFill/>
+        </p:spPr>
+        <p:txBody>
+          <a:bodyPr wrap="square" rtlCol="0">
+            <a:spAutoFit/>
+          </a:bodyPr>
+          <a:lstStyle/>
+          <a:p>
+            <a:r>
+              <a:rPr lang="en-CA" dirty="0"/>
+              <a:t>(6)</a:t>
+            </a:r>
+          </a:p>
+          <a:p>
+            <a:r>
+              <a:rPr lang="en-CA" dirty="0"/>
+              <a:t>A0=1e6</a:t>
+            </a:r>
+          </a:p>
+        </p:txBody>
+      </p:sp>
+      <p:sp>
+        <p:nvSpPr>
+          <p:cNvPr id="20" name="TextBox 19">
+            <a:extLst>
+              <a:ext uri="{FF2B5EF4-FFF2-40B4-BE49-F238E27FC236}">
+                <a16:creationId xmlns:a16="http://schemas.microsoft.com/office/drawing/2014/main" id="{CC0B5B15-4F4C-47DB-8EED-9A57CCD7057A}"/>
+              </a:ext>
+            </a:extLst>
+          </p:cNvPr>
+          <p:cNvSpPr txBox="1"/>
+          <p:nvPr/>
+        </p:nvSpPr>
+        <p:spPr>
+          <a:xfrm>
+            <a:off x="2813024" y="1068759"/>
+            <a:ext cx="1280986" cy="646331"/>
+          </a:xfrm>
+          <a:prstGeom prst="rect">
+            <a:avLst/>
+          </a:prstGeom>
+          <a:noFill/>
+        </p:spPr>
+        <p:txBody>
+          <a:bodyPr wrap="square" rtlCol="0">
+            <a:spAutoFit/>
+          </a:bodyPr>
+          <a:lstStyle/>
+          <a:p>
+            <a:r>
+              <a:rPr lang="en-CA" dirty="0"/>
+              <a:t>(7)</a:t>
+            </a:r>
+          </a:p>
+          <a:p>
+            <a:r>
+              <a:rPr lang="en-CA" dirty="0"/>
+              <a:t>A0=1e7</a:t>
+            </a:r>
+          </a:p>
+        </p:txBody>
+      </p:sp>
+      <p:pic>
+        <p:nvPicPr>
+          <p:cNvPr id="3" name="Picture 2">
+            <a:extLst>
+              <a:ext uri="{FF2B5EF4-FFF2-40B4-BE49-F238E27FC236}">
+                <a16:creationId xmlns:a16="http://schemas.microsoft.com/office/drawing/2014/main" id="{15809AE1-CB06-4DA9-BC91-B6BF810EA58B}"/>
+              </a:ext>
+            </a:extLst>
+          </p:cNvPr>
+          <p:cNvPicPr>
+            <a:picLocks noChangeAspect="1"/>
+          </p:cNvPicPr>
+          <p:nvPr/>
+        </p:nvPicPr>
+        <p:blipFill>
+          <a:blip r:embed="rId7">
+            <a:extLst>
+              <a:ext uri="{28A0092B-C50C-407E-A947-70E740481C1C}">
+                <a14:useLocalDpi xmlns:a14="http://schemas.microsoft.com/office/drawing/2010/main" val="0"/>
+              </a:ext>
+            </a:extLst>
+          </a:blip>
+          <a:stretch>
+            <a:fillRect/>
+          </a:stretch>
+        </p:blipFill>
+        <p:spPr>
+          <a:xfrm>
+            <a:off x="2404365" y="1899756"/>
+            <a:ext cx="2405016" cy="2405016"/>
+          </a:xfrm>
+          <a:prstGeom prst="rect">
+            <a:avLst/>
+          </a:prstGeom>
+        </p:spPr>
+      </p:pic>
+      <p:pic>
+        <p:nvPicPr>
+          <p:cNvPr id="5" name="Picture 4">
+            <a:extLst>
+              <a:ext uri="{FF2B5EF4-FFF2-40B4-BE49-F238E27FC236}">
+                <a16:creationId xmlns:a16="http://schemas.microsoft.com/office/drawing/2014/main" id="{A7B81CF7-56F2-4805-B491-51CF926641EB}"/>
+              </a:ext>
+            </a:extLst>
+          </p:cNvPr>
+          <p:cNvPicPr>
+            <a:picLocks noChangeAspect="1"/>
+          </p:cNvPicPr>
+          <p:nvPr/>
+        </p:nvPicPr>
+        <p:blipFill>
+          <a:blip r:embed="rId8">
+            <a:extLst>
+              <a:ext uri="{28A0092B-C50C-407E-A947-70E740481C1C}">
+                <a14:useLocalDpi xmlns:a14="http://schemas.microsoft.com/office/drawing/2010/main" val="0"/>
+              </a:ext>
+            </a:extLst>
+          </a:blip>
+          <a:stretch>
+            <a:fillRect/>
+          </a:stretch>
+        </p:blipFill>
+        <p:spPr>
+          <a:xfrm>
+            <a:off x="2453142" y="4215513"/>
+            <a:ext cx="2405016" cy="2405016"/>
+          </a:xfrm>
+          <a:prstGeom prst="rect">
+            <a:avLst/>
+          </a:prstGeom>
+        </p:spPr>
+      </p:pic>
     </p:spTree>
     <p:extLst>
       <p:ext uri="{BB962C8B-B14F-4D97-AF65-F5344CB8AC3E}">
@@ -5218,4 +5952,299 @@
     </a:ext>
   </a:extLst>
 </a:theme>
+</file>
+
+<file path=ppt/theme/theme2.xml><?xml version="1.0" encoding="utf-8"?>
+<a:theme xmlns:a="http://schemas.openxmlformats.org/drawingml/2006/main" name="Office Theme">
+  <a:themeElements>
+    <a:clrScheme name="Office">
+      <a:dk1>
+        <a:sysClr val="windowText" lastClr="000000"/>
+      </a:dk1>
+      <a:lt1>
+        <a:sysClr val="window" lastClr="FFFFFF"/>
+      </a:lt1>
+      <a:dk2>
+        <a:srgbClr val="44546A"/>
+      </a:dk2>
+      <a:lt2>
+        <a:srgbClr val="E7E6E6"/>
+      </a:lt2>
+      <a:accent1>
+        <a:srgbClr val="4472C4"/>
+      </a:accent1>
+      <a:accent2>
+        <a:srgbClr val="ED7D31"/>
+      </a:accent2>
+      <a:accent3>
+        <a:srgbClr val="A5A5A5"/>
+      </a:accent3>
+      <a:accent4>
+        <a:srgbClr val="FFC000"/>
+      </a:accent4>
+      <a:accent5>
+        <a:srgbClr val="5B9BD5"/>
+      </a:accent5>
+      <a:accent6>
+        <a:srgbClr val="70AD47"/>
+      </a:accent6>
+      <a:hlink>
+        <a:srgbClr val="0563C1"/>
+      </a:hlink>
+      <a:folHlink>
+        <a:srgbClr val="954F72"/>
+      </a:folHlink>
+    </a:clrScheme>
+    <a:fontScheme name="Office">
+      <a:majorFont>
+        <a:latin typeface="Calibri Light" panose="020F0302020204030204"/>
+        <a:ea typeface=""/>
+        <a:cs typeface=""/>
+        <a:font script="Jpan" typeface="游ゴシック Light"/>
+        <a:font script="Hang" typeface="맑은 고딕"/>
+        <a:font script="Hans" typeface="等线 Light"/>
+        <a:font script="Hant" typeface="新細明體"/>
+        <a:font script="Arab" typeface="Times New Roman"/>
+        <a:font script="Hebr" typeface="Times New Roman"/>
+        <a:font script="Thai" typeface="Angsana New"/>
+        <a:font script="Ethi" typeface="Nyala"/>
+        <a:font script="Beng" typeface="Vrinda"/>
+        <a:font script="Gujr" typeface="Shruti"/>
+        <a:font script="Khmr" typeface="MoolBoran"/>
+        <a:font script="Knda" typeface="Tunga"/>
+        <a:font script="Guru" typeface="Raavi"/>
+        <a:font script="Cans" typeface="Euphemia"/>
+        <a:font script="Cher" typeface="Plantagenet Cherokee"/>
+        <a:font script="Yiii" typeface="Microsoft Yi Baiti"/>
+        <a:font script="Tibt" typeface="Microsoft Himalaya"/>
+        <a:font script="Thaa" typeface="MV Boli"/>
+        <a:font script="Deva" typeface="Mangal"/>
+        <a:font script="Telu" typeface="Gautami"/>
+        <a:font script="Taml" typeface="Latha"/>
+        <a:font script="Syrc" typeface="Estrangelo Edessa"/>
+        <a:font script="Orya" typeface="Kalinga"/>
+        <a:font script="Mlym" typeface="Kartika"/>
+        <a:font script="Laoo" typeface="DokChampa"/>
+        <a:font script="Sinh" typeface="Iskoola Pota"/>
+        <a:font script="Mong" typeface="Mongolian Baiti"/>
+        <a:font script="Viet" typeface="Times New Roman"/>
+        <a:font script="Uigh" typeface="Microsoft Uighur"/>
+        <a:font script="Geor" typeface="Sylfaen"/>
+        <a:font script="Armn" typeface="Arial"/>
+        <a:font script="Bugi" typeface="Leelawadee UI"/>
+        <a:font script="Bopo" typeface="Microsoft JhengHei"/>
+        <a:font script="Java" typeface="Javanese Text"/>
+        <a:font script="Lisu" typeface="Segoe UI"/>
+        <a:font script="Mymr" typeface="Myanmar Text"/>
+        <a:font script="Nkoo" typeface="Ebrima"/>
+        <a:font script="Olck" typeface="Nirmala UI"/>
+        <a:font script="Osma" typeface="Ebrima"/>
+        <a:font script="Phag" typeface="Phagspa"/>
+        <a:font script="Syrn" typeface="Estrangelo Edessa"/>
+        <a:font script="Syrj" typeface="Estrangelo Edessa"/>
+        <a:font script="Syre" typeface="Estrangelo Edessa"/>
+        <a:font script="Sora" typeface="Nirmala UI"/>
+        <a:font script="Tale" typeface="Microsoft Tai Le"/>
+        <a:font script="Talu" typeface="Microsoft New Tai Lue"/>
+        <a:font script="Tfng" typeface="Ebrima"/>
+      </a:majorFont>
+      <a:minorFont>
+        <a:latin typeface="Calibri" panose="020F0502020204030204"/>
+        <a:ea typeface=""/>
+        <a:cs typeface=""/>
+        <a:font script="Jpan" typeface="游ゴシック"/>
+        <a:font script="Hang" typeface="맑은 고딕"/>
+        <a:font script="Hans" typeface="等线"/>
+        <a:font script="Hant" typeface="新細明體"/>
+        <a:font script="Arab" typeface="Arial"/>
+        <a:font script="Hebr" typeface="Arial"/>
+        <a:font script="Thai" typeface="Cordia New"/>
+        <a:font script="Ethi" typeface="Nyala"/>
+        <a:font script="Beng" typeface="Vrinda"/>
+        <a:font script="Gujr" typeface="Shruti"/>
+        <a:font script="Khmr" typeface="DaunPenh"/>
+        <a:font script="Knda" typeface="Tunga"/>
+        <a:font script="Guru" typeface="Raavi"/>
+        <a:font script="Cans" typeface="Euphemia"/>
+        <a:font script="Cher" typeface="Plantagenet Cherokee"/>
+        <a:font script="Yiii" typeface="Microsoft Yi Baiti"/>
+        <a:font script="Tibt" typeface="Microsoft Himalaya"/>
+        <a:font script="Thaa" typeface="MV Boli"/>
+        <a:font script="Deva" typeface="Mangal"/>
+        <a:font script="Telu" typeface="Gautami"/>
+        <a:font script="Taml" typeface="Latha"/>
+        <a:font script="Syrc" typeface="Estrangelo Edessa"/>
+        <a:font script="Orya" typeface="Kalinga"/>
+        <a:font script="Mlym" typeface="Kartika"/>
+        <a:font script="Laoo" typeface="DokChampa"/>
+        <a:font script="Sinh" typeface="Iskoola Pota"/>
+        <a:font script="Mong" typeface="Mongolian Baiti"/>
+        <a:font script="Viet" typeface="Arial"/>
+        <a:font script="Uigh" typeface="Microsoft Uighur"/>
+        <a:font script="Geor" typeface="Sylfaen"/>
+        <a:font script="Armn" typeface="Arial"/>
+        <a:font script="Bugi" typeface="Leelawadee UI"/>
+        <a:font script="Bopo" typeface="Microsoft JhengHei"/>
+        <a:font script="Java" typeface="Javanese Text"/>
+        <a:font script="Lisu" typeface="Segoe UI"/>
+        <a:font script="Mymr" typeface="Myanmar Text"/>
+        <a:font script="Nkoo" typeface="Ebrima"/>
+        <a:font script="Olck" typeface="Nirmala UI"/>
+        <a:font script="Osma" typeface="Ebrima"/>
+        <a:font script="Phag" typeface="Phagspa"/>
+        <a:font script="Syrn" typeface="Estrangelo Edessa"/>
+        <a:font script="Syrj" typeface="Estrangelo Edessa"/>
+        <a:font script="Syre" typeface="Estrangelo Edessa"/>
+        <a:font script="Sora" typeface="Nirmala UI"/>
+        <a:font script="Tale" typeface="Microsoft Tai Le"/>
+        <a:font script="Talu" typeface="Microsoft New Tai Lue"/>
+        <a:font script="Tfng" typeface="Ebrima"/>
+      </a:minorFont>
+    </a:fontScheme>
+    <a:fmtScheme name="Office">
+      <a:fillStyleLst>
+        <a:solidFill>
+          <a:schemeClr val="phClr"/>
+        </a:solidFill>
+        <a:gradFill rotWithShape="1">
+          <a:gsLst>
+            <a:gs pos="0">
+              <a:schemeClr val="phClr">
+                <a:lumMod val="110000"/>
+                <a:satMod val="105000"/>
+                <a:tint val="67000"/>
+              </a:schemeClr>
+            </a:gs>
+            <a:gs pos="50000">
+              <a:schemeClr val="phClr">
+                <a:lumMod val="105000"/>
+                <a:satMod val="103000"/>
+                <a:tint val="73000"/>
+              </a:schemeClr>
+            </a:gs>
+            <a:gs pos="100000">
+              <a:schemeClr val="phClr">
+                <a:lumMod val="105000"/>
+                <a:satMod val="109000"/>
+                <a:tint val="81000"/>
+              </a:schemeClr>
+            </a:gs>
+          </a:gsLst>
+          <a:lin ang="5400000" scaled="0"/>
+        </a:gradFill>
+        <a:gradFill rotWithShape="1">
+          <a:gsLst>
+            <a:gs pos="0">
+              <a:schemeClr val="phClr">
+                <a:satMod val="103000"/>
+                <a:lumMod val="102000"/>
+                <a:tint val="94000"/>
+              </a:schemeClr>
+            </a:gs>
+            <a:gs pos="50000">
+              <a:schemeClr val="phClr">
+                <a:satMod val="110000"/>
+                <a:lumMod val="100000"/>
+                <a:shade val="100000"/>
+              </a:schemeClr>
+            </a:gs>
+            <a:gs pos="100000">
+              <a:schemeClr val="phClr">
+                <a:lumMod val="99000"/>
+                <a:satMod val="120000"/>
+                <a:shade val="78000"/>
+              </a:schemeClr>
+            </a:gs>
+          </a:gsLst>
+          <a:lin ang="5400000" scaled="0"/>
+        </a:gradFill>
+      </a:fillStyleLst>
+      <a:lnStyleLst>
+        <a:ln w="6350" cap="flat" cmpd="sng" algn="ctr">
+          <a:solidFill>
+            <a:schemeClr val="phClr"/>
+          </a:solidFill>
+          <a:prstDash val="solid"/>
+          <a:miter lim="800000"/>
+        </a:ln>
+        <a:ln w="12700" cap="flat" cmpd="sng" algn="ctr">
+          <a:solidFill>
+            <a:schemeClr val="phClr"/>
+          </a:solidFill>
+          <a:prstDash val="solid"/>
+          <a:miter lim="800000"/>
+        </a:ln>
+        <a:ln w="19050" cap="flat" cmpd="sng" algn="ctr">
+          <a:solidFill>
+            <a:schemeClr val="phClr"/>
+          </a:solidFill>
+          <a:prstDash val="solid"/>
+          <a:miter lim="800000"/>
+        </a:ln>
+      </a:lnStyleLst>
+      <a:effectStyleLst>
+        <a:effectStyle>
+          <a:effectLst/>
+        </a:effectStyle>
+        <a:effectStyle>
+          <a:effectLst/>
+        </a:effectStyle>
+        <a:effectStyle>
+          <a:effectLst>
+            <a:outerShdw blurRad="57150" dist="19050" dir="5400000" algn="ctr" rotWithShape="0">
+              <a:srgbClr val="000000">
+                <a:alpha val="63000"/>
+              </a:srgbClr>
+            </a:outerShdw>
+          </a:effectLst>
+        </a:effectStyle>
+      </a:effectStyleLst>
+      <a:bgFillStyleLst>
+        <a:solidFill>
+          <a:schemeClr val="phClr"/>
+        </a:solidFill>
+        <a:solidFill>
+          <a:schemeClr val="phClr">
+            <a:tint val="95000"/>
+            <a:satMod val="170000"/>
+          </a:schemeClr>
+        </a:solidFill>
+        <a:gradFill rotWithShape="1">
+          <a:gsLst>
+            <a:gs pos="0">
+              <a:schemeClr val="phClr">
+                <a:tint val="93000"/>
+                <a:satMod val="150000"/>
+                <a:shade val="98000"/>
+                <a:lumMod val="102000"/>
+              </a:schemeClr>
+            </a:gs>
+            <a:gs pos="50000">
+              <a:schemeClr val="phClr">
+                <a:tint val="98000"/>
+                <a:satMod val="130000"/>
+                <a:shade val="90000"/>
+                <a:lumMod val="103000"/>
+              </a:schemeClr>
+            </a:gs>
+            <a:gs pos="100000">
+              <a:schemeClr val="phClr">
+                <a:shade val="63000"/>
+                <a:satMod val="120000"/>
+              </a:schemeClr>
+            </a:gs>
+          </a:gsLst>
+          <a:lin ang="5400000" scaled="0"/>
+        </a:gradFill>
+      </a:bgFillStyleLst>
+    </a:fmtScheme>
+  </a:themeElements>
+  <a:objectDefaults/>
+  <a:extraClrSchemeLst/>
+  <a:extLst>
+    <a:ext uri="{05A4C25C-085E-4340-85A3-A5531E510DB2}">
+      <thm15:themeFamily xmlns:thm15="http://schemas.microsoft.com/office/thememl/2012/main" name="Office Theme" id="{62F939B6-93AF-4DB8-9C6B-D6C7DFDC589F}" vid="{4A3C46E8-61CC-4603-A589-7422A47A8E4A}"/>
+    </a:ext>
+  </a:extLst>
+</a:theme>
 </file>
</xml_diff>

<commit_message>
Testing Kim model: mesh too
</commit_message>
<xml_diff>
--- a/Tests/Nanothermite/Summary_graphs.pptx
+++ b/Tests/Nanothermite/Summary_graphs.pptx
@@ -5,13 +5,14 @@
     <p:sldMasterId id="2147483648" r:id="rId1"/>
   </p:sldMasterIdLst>
   <p:notesMasterIdLst>
-    <p:notesMasterId r:id="rId6"/>
+    <p:notesMasterId r:id="rId7"/>
   </p:notesMasterIdLst>
   <p:sldIdLst>
     <p:sldId id="256" r:id="rId2"/>
     <p:sldId id="258" r:id="rId3"/>
     <p:sldId id="257" r:id="rId4"/>
     <p:sldId id="259" r:id="rId5"/>
+    <p:sldId id="260" r:id="rId6"/>
   </p:sldIdLst>
   <p:sldSz cx="12192000" cy="6858000"/>
   <p:notesSz cx="6858000" cy="9144000"/>
@@ -200,7 +201,7 @@
           <a:p>
             <a:fld id="{B019A618-63AB-4F89-8C61-5DE094D48502}" type="datetimeFigureOut">
               <a:rPr lang="en-CA" smtClean="0"/>
-              <a:t>2019-01-10</a:t>
+              <a:t>2019-01-11</a:t>
             </a:fld>
             <a:endParaRPr lang="en-CA"/>
           </a:p>
@@ -880,7 +881,7 @@
           <a:p>
             <a:fld id="{7B325132-34A0-4949-A128-7FA77212AB09}" type="datetimeFigureOut">
               <a:rPr lang="en-CA" smtClean="0"/>
-              <a:t>2019-01-10</a:t>
+              <a:t>2019-01-11</a:t>
             </a:fld>
             <a:endParaRPr lang="en-CA"/>
           </a:p>
@@ -1080,7 +1081,7 @@
           <a:p>
             <a:fld id="{7B325132-34A0-4949-A128-7FA77212AB09}" type="datetimeFigureOut">
               <a:rPr lang="en-CA" smtClean="0"/>
-              <a:t>2019-01-10</a:t>
+              <a:t>2019-01-11</a:t>
             </a:fld>
             <a:endParaRPr lang="en-CA"/>
           </a:p>
@@ -1290,7 +1291,7 @@
           <a:p>
             <a:fld id="{7B325132-34A0-4949-A128-7FA77212AB09}" type="datetimeFigureOut">
               <a:rPr lang="en-CA" smtClean="0"/>
-              <a:t>2019-01-10</a:t>
+              <a:t>2019-01-11</a:t>
             </a:fld>
             <a:endParaRPr lang="en-CA"/>
           </a:p>
@@ -1490,7 +1491,7 @@
           <a:p>
             <a:fld id="{7B325132-34A0-4949-A128-7FA77212AB09}" type="datetimeFigureOut">
               <a:rPr lang="en-CA" smtClean="0"/>
-              <a:t>2019-01-10</a:t>
+              <a:t>2019-01-11</a:t>
             </a:fld>
             <a:endParaRPr lang="en-CA"/>
           </a:p>
@@ -1766,7 +1767,7 @@
           <a:p>
             <a:fld id="{7B325132-34A0-4949-A128-7FA77212AB09}" type="datetimeFigureOut">
               <a:rPr lang="en-CA" smtClean="0"/>
-              <a:t>2019-01-10</a:t>
+              <a:t>2019-01-11</a:t>
             </a:fld>
             <a:endParaRPr lang="en-CA"/>
           </a:p>
@@ -2034,7 +2035,7 @@
           <a:p>
             <a:fld id="{7B325132-34A0-4949-A128-7FA77212AB09}" type="datetimeFigureOut">
               <a:rPr lang="en-CA" smtClean="0"/>
-              <a:t>2019-01-10</a:t>
+              <a:t>2019-01-11</a:t>
             </a:fld>
             <a:endParaRPr lang="en-CA"/>
           </a:p>
@@ -2449,7 +2450,7 @@
           <a:p>
             <a:fld id="{7B325132-34A0-4949-A128-7FA77212AB09}" type="datetimeFigureOut">
               <a:rPr lang="en-CA" smtClean="0"/>
-              <a:t>2019-01-10</a:t>
+              <a:t>2019-01-11</a:t>
             </a:fld>
             <a:endParaRPr lang="en-CA"/>
           </a:p>
@@ -2591,7 +2592,7 @@
           <a:p>
             <a:fld id="{7B325132-34A0-4949-A128-7FA77212AB09}" type="datetimeFigureOut">
               <a:rPr lang="en-CA" smtClean="0"/>
-              <a:t>2019-01-10</a:t>
+              <a:t>2019-01-11</a:t>
             </a:fld>
             <a:endParaRPr lang="en-CA"/>
           </a:p>
@@ -2704,7 +2705,7 @@
           <a:p>
             <a:fld id="{7B325132-34A0-4949-A128-7FA77212AB09}" type="datetimeFigureOut">
               <a:rPr lang="en-CA" smtClean="0"/>
-              <a:t>2019-01-10</a:t>
+              <a:t>2019-01-11</a:t>
             </a:fld>
             <a:endParaRPr lang="en-CA"/>
           </a:p>
@@ -3017,7 +3018,7 @@
           <a:p>
             <a:fld id="{7B325132-34A0-4949-A128-7FA77212AB09}" type="datetimeFigureOut">
               <a:rPr lang="en-CA" smtClean="0"/>
-              <a:t>2019-01-10</a:t>
+              <a:t>2019-01-11</a:t>
             </a:fld>
             <a:endParaRPr lang="en-CA"/>
           </a:p>
@@ -3306,7 +3307,7 @@
           <a:p>
             <a:fld id="{7B325132-34A0-4949-A128-7FA77212AB09}" type="datetimeFigureOut">
               <a:rPr lang="en-CA" smtClean="0"/>
-              <a:t>2019-01-10</a:t>
+              <a:t>2019-01-11</a:t>
             </a:fld>
             <a:endParaRPr lang="en-CA"/>
           </a:p>
@@ -3549,7 +3550,7 @@
           <a:p>
             <a:fld id="{7B325132-34A0-4949-A128-7FA77212AB09}" type="datetimeFigureOut">
               <a:rPr lang="en-CA" smtClean="0"/>
-              <a:t>2019-01-10</a:t>
+              <a:t>2019-01-11</a:t>
             </a:fld>
             <a:endParaRPr lang="en-CA"/>
           </a:p>
@@ -5650,6 +5651,420 @@
     <p:extLst>
       <p:ext uri="{BB962C8B-B14F-4D97-AF65-F5344CB8AC3E}">
         <p14:creationId xmlns:p14="http://schemas.microsoft.com/office/powerpoint/2010/main" val="1044594811"/>
+      </p:ext>
+    </p:extLst>
+  </p:cSld>
+  <p:clrMapOvr>
+    <a:masterClrMapping/>
+  </p:clrMapOvr>
+</p:sld>
+</file>
+
+<file path=ppt/slides/slide5.xml><?xml version="1.0" encoding="utf-8"?>
+<p:sld xmlns:a="http://schemas.openxmlformats.org/drawingml/2006/main" xmlns:r="http://schemas.openxmlformats.org/officeDocument/2006/relationships" xmlns:p="http://schemas.openxmlformats.org/presentationml/2006/main">
+  <p:cSld>
+    <p:spTree>
+      <p:nvGrpSpPr>
+        <p:cNvPr id="1" name=""/>
+        <p:cNvGrpSpPr/>
+        <p:nvPr/>
+      </p:nvGrpSpPr>
+      <p:grpSpPr>
+        <a:xfrm>
+          <a:off x="0" y="0"/>
+          <a:ext cx="0" cy="0"/>
+          <a:chOff x="0" y="0"/>
+          <a:chExt cx="0" cy="0"/>
+        </a:xfrm>
+      </p:grpSpPr>
+      <p:sp>
+        <p:nvSpPr>
+          <p:cNvPr id="3" name="Subtitle 2">
+            <a:extLst>
+              <a:ext uri="{FF2B5EF4-FFF2-40B4-BE49-F238E27FC236}">
+                <a16:creationId xmlns:a16="http://schemas.microsoft.com/office/drawing/2014/main" id="{7B4A77ED-CB73-4F6A-844B-D49E557325F1}"/>
+              </a:ext>
+            </a:extLst>
+          </p:cNvPr>
+          <p:cNvSpPr>
+            <a:spLocks noGrp="1"/>
+          </p:cNvSpPr>
+          <p:nvPr>
+            <p:ph type="subTitle" idx="1"/>
+          </p:nvPr>
+        </p:nvSpPr>
+        <p:spPr>
+          <a:xfrm>
+            <a:off x="1524000" y="1132113"/>
+            <a:ext cx="4572000" cy="1654629"/>
+          </a:xfrm>
+        </p:spPr>
+        <p:txBody>
+          <a:bodyPr/>
+          <a:lstStyle/>
+          <a:p>
+            <a:pPr algn="l"/>
+            <a:r>
+              <a:rPr lang="en-CA" dirty="0"/>
+              <a:t>rho=f(eta)</a:t>
+            </a:r>
+          </a:p>
+          <a:p>
+            <a:pPr algn="l"/>
+            <a:r>
+              <a:rPr lang="en-CA" dirty="0"/>
+              <a:t>k= f(eta)</a:t>
+            </a:r>
+          </a:p>
+          <a:p>
+            <a:pPr algn="l"/>
+            <a:r>
+              <a:rPr lang="en-CA" dirty="0" err="1"/>
+              <a:t>Cp</a:t>
+            </a:r>
+            <a:r>
+              <a:rPr lang="en-CA" dirty="0"/>
+              <a:t>= f(eta)</a:t>
+            </a:r>
+          </a:p>
+        </p:txBody>
+      </p:sp>
+      <p:sp>
+        <p:nvSpPr>
+          <p:cNvPr id="4" name="Subtitle 2">
+            <a:extLst>
+              <a:ext uri="{FF2B5EF4-FFF2-40B4-BE49-F238E27FC236}">
+                <a16:creationId xmlns:a16="http://schemas.microsoft.com/office/drawing/2014/main" id="{441D23C9-150E-4F25-9614-7576B8B0559B}"/>
+              </a:ext>
+            </a:extLst>
+          </p:cNvPr>
+          <p:cNvSpPr txBox="1">
+            <a:spLocks/>
+          </p:cNvSpPr>
+          <p:nvPr/>
+        </p:nvSpPr>
+        <p:spPr>
+          <a:xfrm>
+            <a:off x="6096000" y="1132114"/>
+            <a:ext cx="4572000" cy="1654629"/>
+          </a:xfrm>
+          <a:prstGeom prst="rect">
+            <a:avLst/>
+          </a:prstGeom>
+        </p:spPr>
+        <p:txBody>
+          <a:bodyPr vert="horz" lIns="91440" tIns="45720" rIns="91440" bIns="45720" rtlCol="0">
+            <a:normAutofit/>
+          </a:bodyPr>
+          <a:lstStyle>
+            <a:lvl1pPr marL="0" indent="0" algn="ctr" defTabSz="914400" rtl="0" eaLnBrk="1" latinLnBrk="0" hangingPunct="1">
+              <a:lnSpc>
+                <a:spcPct val="90000"/>
+              </a:lnSpc>
+              <a:spcBef>
+                <a:spcPts val="1000"/>
+              </a:spcBef>
+              <a:buFont typeface="Arial" panose="020B0604020202020204" pitchFamily="34" charset="0"/>
+              <a:buNone/>
+              <a:defRPr sz="2400" kern="1200">
+                <a:solidFill>
+                  <a:schemeClr val="tx1"/>
+                </a:solidFill>
+                <a:latin typeface="+mn-lt"/>
+                <a:ea typeface="+mn-ea"/>
+                <a:cs typeface="+mn-cs"/>
+              </a:defRPr>
+            </a:lvl1pPr>
+            <a:lvl2pPr marL="457200" indent="0" algn="ctr" defTabSz="914400" rtl="0" eaLnBrk="1" latinLnBrk="0" hangingPunct="1">
+              <a:lnSpc>
+                <a:spcPct val="90000"/>
+              </a:lnSpc>
+              <a:spcBef>
+                <a:spcPts val="500"/>
+              </a:spcBef>
+              <a:buFont typeface="Arial" panose="020B0604020202020204" pitchFamily="34" charset="0"/>
+              <a:buNone/>
+              <a:defRPr sz="2000" kern="1200">
+                <a:solidFill>
+                  <a:schemeClr val="tx1"/>
+                </a:solidFill>
+                <a:latin typeface="+mn-lt"/>
+                <a:ea typeface="+mn-ea"/>
+                <a:cs typeface="+mn-cs"/>
+              </a:defRPr>
+            </a:lvl2pPr>
+            <a:lvl3pPr marL="914400" indent="0" algn="ctr" defTabSz="914400" rtl="0" eaLnBrk="1" latinLnBrk="0" hangingPunct="1">
+              <a:lnSpc>
+                <a:spcPct val="90000"/>
+              </a:lnSpc>
+              <a:spcBef>
+                <a:spcPts val="500"/>
+              </a:spcBef>
+              <a:buFont typeface="Arial" panose="020B0604020202020204" pitchFamily="34" charset="0"/>
+              <a:buNone/>
+              <a:defRPr sz="1800" kern="1200">
+                <a:solidFill>
+                  <a:schemeClr val="tx1"/>
+                </a:solidFill>
+                <a:latin typeface="+mn-lt"/>
+                <a:ea typeface="+mn-ea"/>
+                <a:cs typeface="+mn-cs"/>
+              </a:defRPr>
+            </a:lvl3pPr>
+            <a:lvl4pPr marL="1371600" indent="0" algn="ctr" defTabSz="914400" rtl="0" eaLnBrk="1" latinLnBrk="0" hangingPunct="1">
+              <a:lnSpc>
+                <a:spcPct val="90000"/>
+              </a:lnSpc>
+              <a:spcBef>
+                <a:spcPts val="500"/>
+              </a:spcBef>
+              <a:buFont typeface="Arial" panose="020B0604020202020204" pitchFamily="34" charset="0"/>
+              <a:buNone/>
+              <a:defRPr sz="1600" kern="1200">
+                <a:solidFill>
+                  <a:schemeClr val="tx1"/>
+                </a:solidFill>
+                <a:latin typeface="+mn-lt"/>
+                <a:ea typeface="+mn-ea"/>
+                <a:cs typeface="+mn-cs"/>
+              </a:defRPr>
+            </a:lvl4pPr>
+            <a:lvl5pPr marL="1828800" indent="0" algn="ctr" defTabSz="914400" rtl="0" eaLnBrk="1" latinLnBrk="0" hangingPunct="1">
+              <a:lnSpc>
+                <a:spcPct val="90000"/>
+              </a:lnSpc>
+              <a:spcBef>
+                <a:spcPts val="500"/>
+              </a:spcBef>
+              <a:buFont typeface="Arial" panose="020B0604020202020204" pitchFamily="34" charset="0"/>
+              <a:buNone/>
+              <a:defRPr sz="1600" kern="1200">
+                <a:solidFill>
+                  <a:schemeClr val="tx1"/>
+                </a:solidFill>
+                <a:latin typeface="+mn-lt"/>
+                <a:ea typeface="+mn-ea"/>
+                <a:cs typeface="+mn-cs"/>
+              </a:defRPr>
+            </a:lvl5pPr>
+            <a:lvl6pPr marL="2286000" indent="0" algn="ctr" defTabSz="914400" rtl="0" eaLnBrk="1" latinLnBrk="0" hangingPunct="1">
+              <a:lnSpc>
+                <a:spcPct val="90000"/>
+              </a:lnSpc>
+              <a:spcBef>
+                <a:spcPts val="500"/>
+              </a:spcBef>
+              <a:buFont typeface="Arial" panose="020B0604020202020204" pitchFamily="34" charset="0"/>
+              <a:buNone/>
+              <a:defRPr sz="1600" kern="1200">
+                <a:solidFill>
+                  <a:schemeClr val="tx1"/>
+                </a:solidFill>
+                <a:latin typeface="+mn-lt"/>
+                <a:ea typeface="+mn-ea"/>
+                <a:cs typeface="+mn-cs"/>
+              </a:defRPr>
+            </a:lvl6pPr>
+            <a:lvl7pPr marL="2743200" indent="0" algn="ctr" defTabSz="914400" rtl="0" eaLnBrk="1" latinLnBrk="0" hangingPunct="1">
+              <a:lnSpc>
+                <a:spcPct val="90000"/>
+              </a:lnSpc>
+              <a:spcBef>
+                <a:spcPts val="500"/>
+              </a:spcBef>
+              <a:buFont typeface="Arial" panose="020B0604020202020204" pitchFamily="34" charset="0"/>
+              <a:buNone/>
+              <a:defRPr sz="1600" kern="1200">
+                <a:solidFill>
+                  <a:schemeClr val="tx1"/>
+                </a:solidFill>
+                <a:latin typeface="+mn-lt"/>
+                <a:ea typeface="+mn-ea"/>
+                <a:cs typeface="+mn-cs"/>
+              </a:defRPr>
+            </a:lvl7pPr>
+            <a:lvl8pPr marL="3200400" indent="0" algn="ctr" defTabSz="914400" rtl="0" eaLnBrk="1" latinLnBrk="0" hangingPunct="1">
+              <a:lnSpc>
+                <a:spcPct val="90000"/>
+              </a:lnSpc>
+              <a:spcBef>
+                <a:spcPts val="500"/>
+              </a:spcBef>
+              <a:buFont typeface="Arial" panose="020B0604020202020204" pitchFamily="34" charset="0"/>
+              <a:buNone/>
+              <a:defRPr sz="1600" kern="1200">
+                <a:solidFill>
+                  <a:schemeClr val="tx1"/>
+                </a:solidFill>
+                <a:latin typeface="+mn-lt"/>
+                <a:ea typeface="+mn-ea"/>
+                <a:cs typeface="+mn-cs"/>
+              </a:defRPr>
+            </a:lvl8pPr>
+            <a:lvl9pPr marL="3657600" indent="0" algn="ctr" defTabSz="914400" rtl="0" eaLnBrk="1" latinLnBrk="0" hangingPunct="1">
+              <a:lnSpc>
+                <a:spcPct val="90000"/>
+              </a:lnSpc>
+              <a:spcBef>
+                <a:spcPts val="500"/>
+              </a:spcBef>
+              <a:buFont typeface="Arial" panose="020B0604020202020204" pitchFamily="34" charset="0"/>
+              <a:buNone/>
+              <a:defRPr sz="1600" kern="1200">
+                <a:solidFill>
+                  <a:schemeClr val="tx1"/>
+                </a:solidFill>
+                <a:latin typeface="+mn-lt"/>
+                <a:ea typeface="+mn-ea"/>
+                <a:cs typeface="+mn-cs"/>
+              </a:defRPr>
+            </a:lvl9pPr>
+          </a:lstStyle>
+          <a:p>
+            <a:pPr algn="l"/>
+            <a:r>
+              <a:rPr lang="en-CA" dirty="0" err="1"/>
+              <a:t>Fo</a:t>
+            </a:r>
+            <a:r>
+              <a:rPr lang="en-CA" dirty="0"/>
+              <a:t>=0.2</a:t>
+            </a:r>
+          </a:p>
+          <a:p>
+            <a:pPr algn="l"/>
+            <a:r>
+              <a:rPr lang="en-CA" dirty="0"/>
+              <a:t>6000 time steps</a:t>
+            </a:r>
+          </a:p>
+          <a:p>
+            <a:pPr algn="l"/>
+            <a:r>
+              <a:rPr lang="en-CA" dirty="0"/>
+              <a:t>6 data files</a:t>
+            </a:r>
+          </a:p>
+        </p:txBody>
+      </p:sp>
+      <p:sp>
+        <p:nvSpPr>
+          <p:cNvPr id="2" name="TextBox 1">
+            <a:extLst>
+              <a:ext uri="{FF2B5EF4-FFF2-40B4-BE49-F238E27FC236}">
+                <a16:creationId xmlns:a16="http://schemas.microsoft.com/office/drawing/2014/main" id="{DA4E6C74-1D3B-40B0-9D38-4486ACFDDA5E}"/>
+              </a:ext>
+            </a:extLst>
+          </p:cNvPr>
+          <p:cNvSpPr txBox="1"/>
+          <p:nvPr/>
+        </p:nvSpPr>
+        <p:spPr>
+          <a:xfrm>
+            <a:off x="2119086" y="4267200"/>
+            <a:ext cx="2612571" cy="369332"/>
+          </a:xfrm>
+          <a:prstGeom prst="rect">
+            <a:avLst/>
+          </a:prstGeom>
+          <a:noFill/>
+        </p:spPr>
+        <p:txBody>
+          <a:bodyPr wrap="square" rtlCol="0">
+            <a:spAutoFit/>
+          </a:bodyPr>
+          <a:lstStyle/>
+          <a:p>
+            <a:r>
+              <a:rPr lang="en-CA" dirty="0"/>
+              <a:t>Tests can overwrite: 4,5</a:t>
+            </a:r>
+          </a:p>
+        </p:txBody>
+      </p:sp>
+      <p:sp>
+        <p:nvSpPr>
+          <p:cNvPr id="5" name="TextBox 4">
+            <a:extLst>
+              <a:ext uri="{FF2B5EF4-FFF2-40B4-BE49-F238E27FC236}">
+                <a16:creationId xmlns:a16="http://schemas.microsoft.com/office/drawing/2014/main" id="{898150A5-E4D4-4673-8CF4-C78D89C085C1}"/>
+              </a:ext>
+            </a:extLst>
+          </p:cNvPr>
+          <p:cNvSpPr txBox="1"/>
+          <p:nvPr/>
+        </p:nvSpPr>
+        <p:spPr>
+          <a:xfrm>
+            <a:off x="2119085" y="4801773"/>
+            <a:ext cx="3265715" cy="923330"/>
+          </a:xfrm>
+          <a:prstGeom prst="rect">
+            <a:avLst/>
+          </a:prstGeom>
+          <a:noFill/>
+        </p:spPr>
+        <p:txBody>
+          <a:bodyPr wrap="square" rtlCol="0">
+            <a:spAutoFit/>
+          </a:bodyPr>
+          <a:lstStyle/>
+          <a:p>
+            <a:r>
+              <a:rPr lang="en-CA" dirty="0"/>
+              <a:t>Diverging parameters:</a:t>
+            </a:r>
+          </a:p>
+          <a:p>
+            <a:r>
+              <a:rPr lang="en-CA" dirty="0"/>
+              <a:t>-</a:t>
+            </a:r>
+            <a:r>
+              <a:rPr lang="en-CA" dirty="0" err="1"/>
+              <a:t>Ea</a:t>
+            </a:r>
+            <a:r>
+              <a:rPr lang="en-CA" dirty="0"/>
+              <a:t>=4000, A0=1e6, </a:t>
+            </a:r>
+            <a:r>
+              <a:rPr lang="en-CA" dirty="0" err="1"/>
+              <a:t>dH</a:t>
+            </a:r>
+            <a:r>
+              <a:rPr lang="en-CA" dirty="0"/>
+              <a:t>=300000</a:t>
+            </a:r>
+          </a:p>
+          <a:p>
+            <a:r>
+              <a:rPr lang="en-CA" dirty="0"/>
+              <a:t>-</a:t>
+            </a:r>
+            <a:r>
+              <a:rPr lang="en-CA" dirty="0" err="1"/>
+              <a:t>Ea</a:t>
+            </a:r>
+            <a:r>
+              <a:rPr lang="en-CA" dirty="0"/>
+              <a:t>=4000, A0=1e8, </a:t>
+            </a:r>
+            <a:r>
+              <a:rPr lang="en-CA" dirty="0" err="1"/>
+              <a:t>dH</a:t>
+            </a:r>
+            <a:r>
+              <a:rPr lang="en-CA" dirty="0"/>
+              <a:t>=300000</a:t>
+            </a:r>
+          </a:p>
+        </p:txBody>
+      </p:sp>
+    </p:spTree>
+    <p:extLst>
+      <p:ext uri="{BB962C8B-B14F-4D97-AF65-F5344CB8AC3E}">
+        <p14:creationId xmlns:p14="http://schemas.microsoft.com/office/powerpoint/2010/main" val="2294517389"/>
       </p:ext>
     </p:extLst>
   </p:cSld>

</xml_diff>